<commit_message>
Update Logistical Regression - Assignment 2.pptx
Update presentation with new results
</commit_message>
<xml_diff>
--- a/logistical_regression/Logistical Regression - Assignment 2.pptx
+++ b/logistical_regression/Logistical Regression - Assignment 2.pptx
@@ -5,10 +5,10 @@
     <p:sldMasterId id="2147483768" r:id="rId4"/>
   </p:sldMasterIdLst>
   <p:notesMasterIdLst>
-    <p:notesMasterId r:id="rId15"/>
+    <p:notesMasterId r:id="rId14"/>
   </p:notesMasterIdLst>
   <p:handoutMasterIdLst>
-    <p:handoutMasterId r:id="rId16"/>
+    <p:handoutMasterId r:id="rId15"/>
   </p:handoutMasterIdLst>
   <p:sldIdLst>
     <p:sldId id="3825" r:id="rId5"/>
@@ -16,11 +16,10 @@
     <p:sldId id="3828" r:id="rId7"/>
     <p:sldId id="3849" r:id="rId8"/>
     <p:sldId id="3837" r:id="rId9"/>
-    <p:sldId id="3852" r:id="rId10"/>
-    <p:sldId id="3854" r:id="rId11"/>
-    <p:sldId id="3853" r:id="rId12"/>
-    <p:sldId id="3827" r:id="rId13"/>
-    <p:sldId id="3834" r:id="rId14"/>
+    <p:sldId id="3854" r:id="rId10"/>
+    <p:sldId id="3853" r:id="rId11"/>
+    <p:sldId id="3827" r:id="rId12"/>
+    <p:sldId id="3834" r:id="rId13"/>
   </p:sldIdLst>
   <p:sldSz cx="12192000" cy="6858000"/>
   <p:notesSz cx="6858000" cy="9144000"/>
@@ -251,7 +250,7 @@
           <a:p>
             <a:fld id="{41F4E079-3A7A-449C-B486-B22E81642837}" type="datetime1">
               <a:rPr lang="en-GB" smtClean="0"/>
-              <a:t>04/06/2021</a:t>
+              <a:t>10/06/2021</a:t>
             </a:fld>
             <a:endParaRPr lang="en-GB"/>
           </a:p>
@@ -431,7 +430,7 @@
             <a:fld id="{C745DD03-4868-4DBD-8FDF-AA6B2BEDF17D}" type="datetime1">
               <a:rPr lang="en-GB" smtClean="0"/>
               <a:pPr/>
-              <a:t>04/06/2021</a:t>
+              <a:t>10/06/2021</a:t>
             </a:fld>
             <a:endParaRPr lang="en-GB"/>
           </a:p>
@@ -1117,7 +1116,7 @@
     </p:spTree>
     <p:extLst>
       <p:ext uri="{BB962C8B-B14F-4D97-AF65-F5344CB8AC3E}">
-        <p14:creationId xmlns:p14="http://schemas.microsoft.com/office/powerpoint/2010/main" val="2595766924"/>
+        <p14:creationId xmlns:p14="http://schemas.microsoft.com/office/powerpoint/2010/main" val="2006578575"/>
       </p:ext>
     </p:extLst>
   </p:cSld>
@@ -1171,7 +1170,7 @@
           <a:bodyPr/>
           <a:lstStyle/>
           <a:p>
-            <a:endParaRPr lang="en-GB" dirty="0"/>
+            <a:endParaRPr lang="en-GB"/>
           </a:p>
         </p:txBody>
       </p:sp>
@@ -1202,7 +1201,7 @@
     </p:spTree>
     <p:extLst>
       <p:ext uri="{BB962C8B-B14F-4D97-AF65-F5344CB8AC3E}">
-        <p14:creationId xmlns:p14="http://schemas.microsoft.com/office/powerpoint/2010/main" val="2006578575"/>
+        <p14:creationId xmlns:p14="http://schemas.microsoft.com/office/powerpoint/2010/main" val="4246330425"/>
       </p:ext>
     </p:extLst>
   </p:cSld>
@@ -1256,7 +1255,10 @@
           <a:bodyPr/>
           <a:lstStyle/>
           <a:p>
-            <a:endParaRPr lang="en-GB"/>
+            <a:r>
+              <a:rPr lang="en-GB" dirty="0"/>
+              <a:t>John Hughes is a fictional character</a:t>
+            </a:r>
           </a:p>
         </p:txBody>
       </p:sp>
@@ -1287,7 +1289,7 @@
     </p:spTree>
     <p:extLst>
       <p:ext uri="{BB962C8B-B14F-4D97-AF65-F5344CB8AC3E}">
-        <p14:creationId xmlns:p14="http://schemas.microsoft.com/office/powerpoint/2010/main" val="4246330425"/>
+        <p14:creationId xmlns:p14="http://schemas.microsoft.com/office/powerpoint/2010/main" val="2857171978"/>
       </p:ext>
     </p:extLst>
   </p:cSld>
@@ -1341,10 +1343,7 @@
           <a:bodyPr/>
           <a:lstStyle/>
           <a:p>
-            <a:r>
-              <a:rPr lang="en-GB" dirty="0"/>
-              <a:t>John Hughes is a fictional character</a:t>
-            </a:r>
+            <a:endParaRPr lang="en-GB" dirty="0"/>
           </a:p>
         </p:txBody>
       </p:sp>
@@ -1367,91 +1366,6 @@
             <a:fld id="{D40C6A29-4676-420C-BBE3-ACC2B80F64D4}" type="slidenum">
               <a:rPr lang="en-GB" smtClean="0"/>
               <a:t>9</a:t>
-            </a:fld>
-            <a:endParaRPr lang="en-GB"/>
-          </a:p>
-        </p:txBody>
-      </p:sp>
-    </p:spTree>
-    <p:extLst>
-      <p:ext uri="{BB962C8B-B14F-4D97-AF65-F5344CB8AC3E}">
-        <p14:creationId xmlns:p14="http://schemas.microsoft.com/office/powerpoint/2010/main" val="2857171978"/>
-      </p:ext>
-    </p:extLst>
-  </p:cSld>
-  <p:clrMapOvr>
-    <a:masterClrMapping/>
-  </p:clrMapOvr>
-</p:notes>
-</file>
-
-<file path=ppt/notesSlides/notesSlide9.xml><?xml version="1.0" encoding="utf-8"?>
-<p:notes xmlns:a="http://schemas.openxmlformats.org/drawingml/2006/main" xmlns:r="http://schemas.openxmlformats.org/officeDocument/2006/relationships" xmlns:p="http://schemas.openxmlformats.org/presentationml/2006/main">
-  <p:cSld>
-    <p:spTree>
-      <p:nvGrpSpPr>
-        <p:cNvPr id="1" name=""/>
-        <p:cNvGrpSpPr/>
-        <p:nvPr/>
-      </p:nvGrpSpPr>
-      <p:grpSpPr>
-        <a:xfrm>
-          <a:off x="0" y="0"/>
-          <a:ext cx="0" cy="0"/>
-          <a:chOff x="0" y="0"/>
-          <a:chExt cx="0" cy="0"/>
-        </a:xfrm>
-      </p:grpSpPr>
-      <p:sp>
-        <p:nvSpPr>
-          <p:cNvPr id="2" name="Slide Image Placeholder 1"/>
-          <p:cNvSpPr>
-            <a:spLocks noGrp="1" noRot="1" noChangeAspect="1"/>
-          </p:cNvSpPr>
-          <p:nvPr>
-            <p:ph type="sldImg"/>
-          </p:nvPr>
-        </p:nvSpPr>
-        <p:spPr/>
-      </p:sp>
-      <p:sp>
-        <p:nvSpPr>
-          <p:cNvPr id="3" name="Notes Placeholder 2"/>
-          <p:cNvSpPr>
-            <a:spLocks noGrp="1"/>
-          </p:cNvSpPr>
-          <p:nvPr>
-            <p:ph type="body" idx="1"/>
-          </p:nvPr>
-        </p:nvSpPr>
-        <p:spPr/>
-        <p:txBody>
-          <a:bodyPr/>
-          <a:lstStyle/>
-          <a:p>
-            <a:endParaRPr lang="en-GB" dirty="0"/>
-          </a:p>
-        </p:txBody>
-      </p:sp>
-      <p:sp>
-        <p:nvSpPr>
-          <p:cNvPr id="4" name="Slide Number Placeholder 3"/>
-          <p:cNvSpPr>
-            <a:spLocks noGrp="1"/>
-          </p:cNvSpPr>
-          <p:nvPr>
-            <p:ph type="sldNum" sz="quarter" idx="5"/>
-          </p:nvPr>
-        </p:nvSpPr>
-        <p:spPr/>
-        <p:txBody>
-          <a:bodyPr/>
-          <a:lstStyle/>
-          <a:p>
-            <a:pPr rtl="0"/>
-            <a:fld id="{D40C6A29-4676-420C-BBE3-ACC2B80F64D4}" type="slidenum">
-              <a:rPr lang="en-GB" smtClean="0"/>
-              <a:t>10</a:t>
             </a:fld>
             <a:endParaRPr lang="en-GB"/>
           </a:p>
@@ -12630,7 +12544,7 @@
                   <a:srgbClr val="FFFFFF"/>
                 </a:solidFill>
               </a:rPr>
-              <a:t>Logistical Regression – Assignment #2</a:t>
+              <a:t>Logistical Regression – Assignment #2 (Revised)</a:t>
             </a:r>
             <a:endParaRPr lang="en-GB" dirty="0"/>
           </a:p>
@@ -12702,189 +12616,6 @@
     <p:extLst>
       <p:ext uri="{BB962C8B-B14F-4D97-AF65-F5344CB8AC3E}">
         <p14:creationId xmlns:p14="http://schemas.microsoft.com/office/powerpoint/2010/main" val="800962904"/>
-      </p:ext>
-    </p:extLst>
-  </p:cSld>
-  <p:clrMapOvr>
-    <a:masterClrMapping/>
-  </p:clrMapOvr>
-</p:sld>
-</file>
-
-<file path=ppt/slides/slide10.xml><?xml version="1.0" encoding="utf-8"?>
-<p:sld xmlns:a="http://schemas.openxmlformats.org/drawingml/2006/main" xmlns:r="http://schemas.openxmlformats.org/officeDocument/2006/relationships" xmlns:p="http://schemas.openxmlformats.org/presentationml/2006/main">
-  <p:cSld>
-    <p:spTree>
-      <p:nvGrpSpPr>
-        <p:cNvPr id="1" name=""/>
-        <p:cNvGrpSpPr/>
-        <p:nvPr/>
-      </p:nvGrpSpPr>
-      <p:grpSpPr>
-        <a:xfrm>
-          <a:off x="0" y="0"/>
-          <a:ext cx="0" cy="0"/>
-          <a:chOff x="0" y="0"/>
-          <a:chExt cx="0" cy="0"/>
-        </a:xfrm>
-      </p:grpSpPr>
-      <p:sp>
-        <p:nvSpPr>
-          <p:cNvPr id="2" name="Title 1">
-            <a:extLst>
-              <a:ext uri="{FF2B5EF4-FFF2-40B4-BE49-F238E27FC236}">
-                <a16:creationId xmlns:a16="http://schemas.microsoft.com/office/drawing/2014/main" id="{659706C9-F26D-46CA-93BF-8C27012F6B12}"/>
-              </a:ext>
-            </a:extLst>
-          </p:cNvPr>
-          <p:cNvSpPr>
-            <a:spLocks noGrp="1"/>
-          </p:cNvSpPr>
-          <p:nvPr>
-            <p:ph type="title"/>
-          </p:nvPr>
-        </p:nvSpPr>
-        <p:spPr/>
-        <p:txBody>
-          <a:bodyPr rtlCol="0"/>
-          <a:lstStyle/>
-          <a:p>
-            <a:pPr rtl="0"/>
-            <a:r>
-              <a:rPr lang="en-GB"/>
-              <a:t>Thank you</a:t>
-            </a:r>
-          </a:p>
-        </p:txBody>
-      </p:sp>
-      <p:sp>
-        <p:nvSpPr>
-          <p:cNvPr id="5" name="Footer Placeholder 4">
-            <a:extLst>
-              <a:ext uri="{FF2B5EF4-FFF2-40B4-BE49-F238E27FC236}">
-                <a16:creationId xmlns:a16="http://schemas.microsoft.com/office/drawing/2014/main" id="{C75D06EF-9416-46F7-8230-B49EE1269F53}"/>
-              </a:ext>
-            </a:extLst>
-          </p:cNvPr>
-          <p:cNvSpPr>
-            <a:spLocks noGrp="1"/>
-          </p:cNvSpPr>
-          <p:nvPr>
-            <p:ph type="ftr" sz="quarter" idx="11"/>
-          </p:nvPr>
-        </p:nvSpPr>
-        <p:spPr/>
-        <p:txBody>
-          <a:bodyPr rtlCol="0"/>
-          <a:lstStyle/>
-          <a:p>
-            <a:pPr>
-              <a:defRPr/>
-            </a:pPr>
-            <a:r>
-              <a:rPr lang="en-GB" dirty="0">
-                <a:solidFill>
-                  <a:prstClr val="black">
-                    <a:tint val="75000"/>
-                  </a:prstClr>
-                </a:solidFill>
-              </a:rPr>
-              <a:t>Logistical Regression</a:t>
-            </a:r>
-          </a:p>
-        </p:txBody>
-      </p:sp>
-      <p:sp>
-        <p:nvSpPr>
-          <p:cNvPr id="6" name="Slide Number Placeholder 5">
-            <a:extLst>
-              <a:ext uri="{FF2B5EF4-FFF2-40B4-BE49-F238E27FC236}">
-                <a16:creationId xmlns:a16="http://schemas.microsoft.com/office/drawing/2014/main" id="{7359025F-68D1-4F50-8480-3F981455D4DE}"/>
-              </a:ext>
-            </a:extLst>
-          </p:cNvPr>
-          <p:cNvSpPr>
-            <a:spLocks noGrp="1"/>
-          </p:cNvSpPr>
-          <p:nvPr>
-            <p:ph type="sldNum" sz="quarter" idx="12"/>
-          </p:nvPr>
-        </p:nvSpPr>
-        <p:spPr/>
-        <p:txBody>
-          <a:bodyPr rtlCol="0"/>
-          <a:lstStyle/>
-          <a:p>
-            <a:pPr lvl="0" rtl="0"/>
-            <a:fld id="{D76B855D-E9CC-4FF8-AD85-6CDC7B89A0DE}" type="slidenum">
-              <a:rPr lang="en-GB" smtClean="0"/>
-              <a:pPr lvl="0" rtl="0"/>
-              <a:t>10</a:t>
-            </a:fld>
-            <a:endParaRPr lang="en-GB"/>
-          </a:p>
-        </p:txBody>
-      </p:sp>
-      <p:sp>
-        <p:nvSpPr>
-          <p:cNvPr id="3" name="Content Placeholder 2">
-            <a:extLst>
-              <a:ext uri="{FF2B5EF4-FFF2-40B4-BE49-F238E27FC236}">
-                <a16:creationId xmlns:a16="http://schemas.microsoft.com/office/drawing/2014/main" id="{21F0B6E0-1F7C-4E6A-87B1-554ADE739CD1}"/>
-              </a:ext>
-            </a:extLst>
-          </p:cNvPr>
-          <p:cNvSpPr>
-            <a:spLocks noGrp="1"/>
-          </p:cNvSpPr>
-          <p:nvPr>
-            <p:ph idx="1"/>
-          </p:nvPr>
-        </p:nvSpPr>
-        <p:spPr/>
-        <p:txBody>
-          <a:bodyPr vert="horz" lIns="91440" tIns="45720" rIns="91440" bIns="45720" rtlCol="0" anchor="t">
-            <a:normAutofit/>
-          </a:bodyPr>
-          <a:lstStyle/>
-          <a:p>
-            <a:r>
-              <a:rPr lang="en-GB" dirty="0"/>
-              <a:t>Raj Dholakia</a:t>
-            </a:r>
-          </a:p>
-          <a:p>
-            <a:pPr rtl="0">
-              <a:spcBef>
-                <a:spcPts val="3000"/>
-              </a:spcBef>
-            </a:pPr>
-            <a:r>
-              <a:rPr lang="en-GB" sz="1800" dirty="0"/>
-              <a:t>raj.dholakia@dcmail.ca</a:t>
-            </a:r>
-          </a:p>
-          <a:p>
-            <a:pPr>
-              <a:spcBef>
-                <a:spcPts val="3000"/>
-              </a:spcBef>
-            </a:pPr>
-            <a:r>
-              <a:rPr lang="en-GB" sz="1800" dirty="0">
-                <a:ea typeface="+mn-lt"/>
-                <a:cs typeface="+mn-lt"/>
-              </a:rPr>
-              <a:t>Student ID: 100813041</a:t>
-            </a:r>
-            <a:endParaRPr lang="en-GB" sz="1800" dirty="0"/>
-          </a:p>
-        </p:txBody>
-      </p:sp>
-    </p:spTree>
-    <p:extLst>
-      <p:ext uri="{BB962C8B-B14F-4D97-AF65-F5344CB8AC3E}">
-        <p14:creationId xmlns:p14="http://schemas.microsoft.com/office/powerpoint/2010/main" val="962258905"/>
       </p:ext>
     </p:extLst>
   </p:cSld>
@@ -12933,10 +12664,10 @@
           <a:lstStyle/>
           <a:p>
             <a:r>
-              <a:rPr lang="en-GB"/>
+              <a:rPr lang="en-GB" dirty="0"/>
               <a:t>Table of Contents</a:t>
             </a:r>
-            <a:endParaRPr lang="en-US"/>
+            <a:endParaRPr lang="en-US" dirty="0"/>
           </a:p>
         </p:txBody>
       </p:sp>
@@ -13050,7 +12781,7 @@
                   </a:prstClr>
                 </a:solidFill>
               </a:rPr>
-              <a:t>Logistical Regression</a:t>
+              <a:t>Logistical Regression (Revised)</a:t>
             </a:r>
           </a:p>
         </p:txBody>
@@ -13244,7 +12975,7 @@
         </p:blipFill>
         <p:spPr>
           <a:xfrm>
-            <a:off x="6700761" y="365124"/>
+            <a:off x="6748088" y="365124"/>
             <a:ext cx="5421500" cy="2224708"/>
           </a:xfrm>
           <a:prstGeom prst="rect">
@@ -13487,7 +13218,7 @@
                   </a:prstClr>
                 </a:solidFill>
               </a:rPr>
-              <a:t>Logistical Regression</a:t>
+              <a:t>Logistical Regression (Revised)</a:t>
             </a:r>
           </a:p>
         </p:txBody>
@@ -13721,7 +13452,7 @@
         <p:spPr>
           <a:xfrm>
             <a:off x="633456" y="1946684"/>
-            <a:ext cx="5397237" cy="4351338"/>
+            <a:ext cx="5726524" cy="4425132"/>
           </a:xfrm>
         </p:spPr>
         <p:txBody>
@@ -13744,7 +13475,7 @@
             </a:pPr>
             <a:r>
               <a:rPr lang="en-US" sz="2100" dirty="0"/>
-              <a:t>As the training sample size increases, the model training recall decreases and the model validation recall increases. This shows that </a:t>
+              <a:t>As the training sample size increases, the model training recall decreases and the model validation recall increases only till the training size is 100 samples. Hence, </a:t>
             </a:r>
             <a:r>
               <a:rPr lang="en-US" sz="2100" b="1" dirty="0"/>
@@ -13752,15 +13483,15 @@
             </a:r>
             <a:r>
               <a:rPr lang="en-US" sz="2100" dirty="0"/>
-              <a:t>should ideally </a:t>
+              <a:t>beyond 100 samples should </a:t>
             </a:r>
             <a:r>
               <a:rPr lang="en-US" sz="2100" b="1" dirty="0"/>
-              <a:t>improve the performance </a:t>
+              <a:t>not improve the performance </a:t>
             </a:r>
             <a:r>
               <a:rPr lang="en-US" sz="2100" dirty="0"/>
-              <a:t>of the model on the validation.</a:t>
+              <a:t>of the model.</a:t>
             </a:r>
           </a:p>
           <a:p>
@@ -13769,7 +13500,7 @@
             </a:pPr>
             <a:r>
               <a:rPr lang="en-US" sz="2100" dirty="0"/>
-              <a:t>The difference between the training and validation recall values can be considered as the variance in the model. Initially, the model has high variance, but when the model is trained on the full dataset, the </a:t>
+              <a:t>The difference between the training and validation recall values can be considered as the variance in the model. Initially, the model has high variance, but when the model is trained on the more than 100 training samples, the </a:t>
             </a:r>
             <a:r>
               <a:rPr lang="en-US" sz="2100" b="1" dirty="0"/>
@@ -13807,7 +13538,7 @@
             </a:r>
             <a:r>
               <a:rPr lang="en-US" sz="2100" b="1" dirty="0"/>
-              <a:t>recall score of about 82% </a:t>
+              <a:t>validation recall score of about 79% </a:t>
             </a:r>
             <a:r>
               <a:rPr lang="en-US" sz="2100" dirty="0"/>
@@ -13846,8 +13577,8 @@
         </p:blipFill>
         <p:spPr>
           <a:xfrm>
-            <a:off x="7485560" y="4679575"/>
-            <a:ext cx="2714442" cy="1238629"/>
+            <a:off x="7485560" y="4727428"/>
+            <a:ext cx="2714442" cy="1142922"/>
           </a:xfrm>
           <a:custGeom>
             <a:avLst/>
@@ -14077,9 +13808,9 @@
           </p:cNvPicPr>
           <p:nvPr/>
         </p:nvPicPr>
-        <p:blipFill rotWithShape="1">
+        <p:blipFill>
           <a:blip r:embed="rId4"/>
-          <a:srcRect l="120" r="8359"/>
+          <a:srcRect l="681" r="681"/>
           <a:stretch/>
         </p:blipFill>
         <p:spPr>
@@ -14268,7 +13999,7 @@
                   </a:prstClr>
                 </a:solidFill>
               </a:rPr>
-              <a:t>Logistical Regression</a:t>
+              <a:t>Logistical Regression (Revised)</a:t>
             </a:r>
           </a:p>
         </p:txBody>
@@ -14488,7 +14219,7 @@
           <a:p>
             <a:r>
               <a:rPr lang="en-GB" sz="3600" dirty="0"/>
-              <a:t>Standard Logistical Regression Model</a:t>
+              <a:t>Standard vs Optimized Logistical Regression Model</a:t>
             </a:r>
           </a:p>
         </p:txBody>
@@ -14517,7 +14248,7 @@
         </p:spPr>
         <p:txBody>
           <a:bodyPr vert="horz" lIns="91440" tIns="45720" rIns="91440" bIns="45720" rtlCol="0" anchor="t">
-            <a:normAutofit fontScale="70000" lnSpcReduction="20000"/>
+            <a:normAutofit fontScale="55000" lnSpcReduction="20000"/>
           </a:bodyPr>
           <a:lstStyle/>
           <a:p>
@@ -14526,44 +14257,58 @@
                 <a:ea typeface="+mn-lt"/>
                 <a:cs typeface="+mn-lt"/>
               </a:rPr>
-              <a:t>As the dataset is imbalanced, the weighted and macro averages of the metrics will not provide a holistic understanding of the model’s performance. Hence, the model is evaluated by observing the metrics individually for positive (deceased) and negative (alive) samples.</a:t>
-            </a:r>
-          </a:p>
-          <a:p>
+              <a:t>The model has achieved an overall </a:t>
+            </a:r>
+            <a:r>
+              <a:rPr lang="en-US" sz="2400" b="1" dirty="0">
+                <a:ea typeface="+mn-lt"/>
+                <a:cs typeface="+mn-lt"/>
+              </a:rPr>
+              <a:t>F1 score of 80%</a:t>
+            </a:r>
             <a:r>
               <a:rPr lang="en-US" sz="2400" dirty="0">
                 <a:ea typeface="+mn-lt"/>
                 <a:cs typeface="+mn-lt"/>
               </a:rPr>
-              <a:t>The standard model has a F1 score of </a:t>
+              <a:t>. As the dataset is imbalanced, the overall F1 score does not provide a holistic understanding of the model’s performance.</a:t>
+            </a:r>
+          </a:p>
+          <a:p>
+            <a:r>
+              <a:rPr lang="en-US" sz="2400" dirty="0">
+                <a:ea typeface="+mn-lt"/>
+                <a:cs typeface="+mn-lt"/>
+              </a:rPr>
+              <a:t>Considering the model’s performance for each class individually, we observe a F1 score of </a:t>
             </a:r>
             <a:r>
               <a:rPr lang="en-US" sz="2400" b="1" dirty="0">
                 <a:ea typeface="+mn-lt"/>
                 <a:cs typeface="+mn-lt"/>
               </a:rPr>
-              <a:t>79%</a:t>
+              <a:t>85%</a:t>
             </a:r>
             <a:r>
               <a:rPr lang="en-US" sz="2400" dirty="0">
                 <a:ea typeface="+mn-lt"/>
                 <a:cs typeface="+mn-lt"/>
               </a:rPr>
-              <a:t> when predicting negative examples and </a:t>
+              <a:t> for positive (deceased) and </a:t>
             </a:r>
             <a:r>
               <a:rPr lang="en-US" sz="2400" b="1" dirty="0">
                 <a:ea typeface="+mn-lt"/>
                 <a:cs typeface="+mn-lt"/>
               </a:rPr>
-              <a:t>62% </a:t>
+              <a:t>70% </a:t>
             </a:r>
             <a:r>
               <a:rPr lang="en-US" sz="2400" dirty="0">
                 <a:ea typeface="+mn-lt"/>
                 <a:cs typeface="+mn-lt"/>
               </a:rPr>
-              <a:t>when predicting positive examples.</a:t>
+              <a:t>for negative (alive) samples (patients). </a:t>
             </a:r>
           </a:p>
           <a:p>
@@ -14572,39 +14317,184 @@
                 <a:ea typeface="+mn-lt"/>
                 <a:cs typeface="+mn-lt"/>
               </a:rPr>
-              <a:t>The model performance is worse (</a:t>
+              <a:t>There is huge discrepancy (</a:t>
             </a:r>
             <a:r>
               <a:rPr lang="en-US" sz="2400" b="1" dirty="0">
                 <a:ea typeface="+mn-lt"/>
                 <a:cs typeface="+mn-lt"/>
               </a:rPr>
-              <a:t>difference of 17%</a:t>
+              <a:t>difference of 15%</a:t>
             </a:r>
             <a:r>
               <a:rPr lang="en-US" sz="2400" dirty="0">
                 <a:ea typeface="+mn-lt"/>
                 <a:cs typeface="+mn-lt"/>
               </a:rPr>
-              <a:t> in F1 scores) when predicting positive examples than negatives examples.</a:t>
+              <a:t> in F1 scores) in the model’s performance when predicting the two different classes.</a:t>
             </a:r>
           </a:p>
           <a:p>
             <a:r>
               <a:rPr lang="en-US" sz="2400" dirty="0"/>
-              <a:t>Using insights from the learning curve, we can conclude that the reason for the above discrepancy in model’s performance is the </a:t>
+              <a:t>One of the reasons for this discrepancy can be the </a:t>
             </a:r>
             <a:r>
               <a:rPr lang="en-US" sz="2400" b="1" dirty="0"/>
-              <a:t>imbalance in data</a:t>
+              <a:t>imbalance in the data </a:t>
             </a:r>
             <a:r>
               <a:rPr lang="en-US" sz="2400" dirty="0"/>
-              <a:t>. Hence, adding more positive examples to the dataset to improve the balance, which will in turn make the model’s performance more consistent at predicting both the classes.</a:t>
-            </a:r>
-          </a:p>
-        </p:txBody>
-      </p:sp>
+              <a:t>(mentioned in </a:t>
+            </a:r>
+            <a:r>
+              <a:rPr lang="en-US" sz="2400" dirty="0">
+                <a:hlinkClick r:id="rId3" action="ppaction://hlinksldjump"/>
+              </a:rPr>
+              <a:t>Key Features section</a:t>
+            </a:r>
+            <a:r>
+              <a:rPr lang="en-US" sz="2400" dirty="0"/>
+              <a:t>).</a:t>
+            </a:r>
+          </a:p>
+          <a:p>
+            <a:r>
+              <a:rPr lang="en-US" sz="2400" dirty="0"/>
+              <a:t>The learning curve further supports the the above claim as it shows that a minimum number of samples is required for the model to perform consistently. The number of deceased samples might not be enough for the model to predict well.</a:t>
+            </a:r>
+          </a:p>
+          <a:p>
+            <a:r>
+              <a:rPr lang="en-US" sz="2400" dirty="0"/>
+              <a:t>Hence, creating a more balanced dataset might improve the model’s performance and make it  consistent at predicting both the classes.</a:t>
+            </a:r>
+            <a:endParaRPr lang="en-US" sz="2400" u="sng" dirty="0">
+              <a:ea typeface="+mn-lt"/>
+              <a:cs typeface="+mn-lt"/>
+            </a:endParaRPr>
+          </a:p>
+          <a:p>
+            <a:pPr marL="0" indent="0">
+              <a:buNone/>
+            </a:pPr>
+            <a:r>
+              <a:rPr lang="en-US" sz="2400" u="sng" dirty="0">
+                <a:ea typeface="+mn-lt"/>
+                <a:cs typeface="+mn-lt"/>
+              </a:rPr>
+              <a:t>Comparing both the models:</a:t>
+            </a:r>
+          </a:p>
+          <a:p>
+            <a:r>
+              <a:rPr lang="en-US" sz="2400" dirty="0">
+                <a:ea typeface="+mn-lt"/>
+                <a:cs typeface="+mn-lt"/>
+              </a:rPr>
+              <a:t>Both the models have achieved the same results for </a:t>
+            </a:r>
+            <a:r>
+              <a:rPr lang="en-US" sz="2400" b="1" dirty="0">
+                <a:ea typeface="+mn-lt"/>
+                <a:cs typeface="+mn-lt"/>
+              </a:rPr>
+              <a:t>all </a:t>
+            </a:r>
+            <a:r>
+              <a:rPr lang="en-US" sz="2400" dirty="0">
+                <a:ea typeface="+mn-lt"/>
+                <a:cs typeface="+mn-lt"/>
+              </a:rPr>
+              <a:t>the metrics – there is no difference in the model performances.</a:t>
+            </a:r>
+            <a:endParaRPr lang="en-US" sz="2000" dirty="0">
+              <a:ea typeface="+mn-lt"/>
+              <a:cs typeface="+mn-lt"/>
+            </a:endParaRPr>
+          </a:p>
+          <a:p>
+            <a:pPr lvl="1"/>
+            <a:endParaRPr lang="en-US" sz="2000" dirty="0">
+              <a:ea typeface="+mn-lt"/>
+              <a:cs typeface="+mn-lt"/>
+            </a:endParaRPr>
+          </a:p>
+        </p:txBody>
+      </p:sp>
+      <p:pic>
+        <p:nvPicPr>
+          <p:cNvPr id="4" name="Picture 3">
+            <a:extLst>
+              <a:ext uri="{FF2B5EF4-FFF2-40B4-BE49-F238E27FC236}">
+                <a16:creationId xmlns:a16="http://schemas.microsoft.com/office/drawing/2014/main" id="{B5AF722A-B556-4A78-B5BA-B61ADC7A3E8F}"/>
+              </a:ext>
+            </a:extLst>
+          </p:cNvPr>
+          <p:cNvPicPr>
+            <a:picLocks noChangeAspect="1"/>
+          </p:cNvPicPr>
+          <p:nvPr/>
+        </p:nvPicPr>
+        <p:blipFill>
+          <a:blip r:embed="rId4"/>
+          <a:srcRect/>
+          <a:stretch/>
+        </p:blipFill>
+        <p:spPr>
+          <a:xfrm>
+            <a:off x="6030693" y="3218587"/>
+            <a:ext cx="5775826" cy="3193692"/>
+          </a:xfrm>
+          <a:custGeom>
+            <a:avLst/>
+            <a:gdLst/>
+            <a:ahLst/>
+            <a:cxnLst/>
+            <a:rect l="l" t="t" r="r" b="b"/>
+            <a:pathLst>
+              <a:path w="4438338" h="2323972">
+                <a:moveTo>
+                  <a:pt x="69905" y="0"/>
+                </a:moveTo>
+                <a:lnTo>
+                  <a:pt x="4368433" y="0"/>
+                </a:lnTo>
+                <a:cubicBezTo>
+                  <a:pt x="4407040" y="0"/>
+                  <a:pt x="4438338" y="31298"/>
+                  <a:pt x="4438338" y="69905"/>
+                </a:cubicBezTo>
+                <a:lnTo>
+                  <a:pt x="4438338" y="2254067"/>
+                </a:lnTo>
+                <a:cubicBezTo>
+                  <a:pt x="4438338" y="2292674"/>
+                  <a:pt x="4407040" y="2323972"/>
+                  <a:pt x="4368433" y="2323972"/>
+                </a:cubicBezTo>
+                <a:lnTo>
+                  <a:pt x="69905" y="2323972"/>
+                </a:lnTo>
+                <a:cubicBezTo>
+                  <a:pt x="31298" y="2323972"/>
+                  <a:pt x="0" y="2292674"/>
+                  <a:pt x="0" y="2254067"/>
+                </a:cubicBezTo>
+                <a:lnTo>
+                  <a:pt x="0" y="69905"/>
+                </a:lnTo>
+                <a:cubicBezTo>
+                  <a:pt x="0" y="31298"/>
+                  <a:pt x="31298" y="0"/>
+                  <a:pt x="69905" y="0"/>
+                </a:cubicBezTo>
+                <a:close/>
+              </a:path>
+            </a:pathLst>
+          </a:custGeom>
+        </p:spPr>
+      </p:pic>
       <p:sp>
         <p:nvSpPr>
           <p:cNvPr id="60" name="Freeform: Shape 59">
@@ -14785,14 +14675,14 @@
           <p:nvPr/>
         </p:nvPicPr>
         <p:blipFill>
-          <a:blip r:embed="rId3"/>
+          <a:blip r:embed="rId5"/>
           <a:srcRect/>
           <a:stretch/>
         </p:blipFill>
         <p:spPr>
           <a:xfrm>
-            <a:off x="6774537" y="2485910"/>
-            <a:ext cx="5396775" cy="2213753"/>
+            <a:off x="7152938" y="970173"/>
+            <a:ext cx="5036014" cy="2045880"/>
           </a:xfrm>
           <a:custGeom>
             <a:avLst/>
@@ -14975,7 +14865,7 @@
                   </a:prstClr>
                 </a:solidFill>
               </a:rPr>
-              <a:t>Logistical Regression</a:t>
+              <a:t>Logistical Regression (Revised)</a:t>
             </a:r>
           </a:p>
         </p:txBody>
@@ -15041,7 +14931,7 @@
     </p:spTree>
     <p:extLst>
       <p:ext uri="{BB962C8B-B14F-4D97-AF65-F5344CB8AC3E}">
-        <p14:creationId xmlns:p14="http://schemas.microsoft.com/office/powerpoint/2010/main" val="1228522187"/>
+        <p14:creationId xmlns:p14="http://schemas.microsoft.com/office/powerpoint/2010/main" val="3163893337"/>
       </p:ext>
     </p:extLst>
   </p:cSld>
@@ -15194,9 +15084,17 @@
           <a:lstStyle/>
           <a:p>
             <a:r>
-              <a:rPr lang="en-GB" sz="3600" dirty="0"/>
-              <a:t>Standard vs Optimized Logistical Regression Model</a:t>
-            </a:r>
+              <a:rPr lang="en-US" sz="3200" dirty="0"/>
+              <a:t>Optimized Model</a:t>
+            </a:r>
+            <a:br>
+              <a:rPr lang="en-US" sz="3200" dirty="0"/>
+            </a:br>
+            <a:r>
+              <a:rPr lang="en-US" sz="2400" dirty="0"/>
+              <a:t>Hyperparameters and the ROC Curve</a:t>
+            </a:r>
+            <a:endParaRPr lang="en-GB" sz="3200" dirty="0"/>
           </a:p>
         </p:txBody>
       </p:sp>
@@ -15219,7 +15117,7 @@
         <p:spPr>
           <a:xfrm>
             <a:off x="633456" y="1946684"/>
-            <a:ext cx="5397237" cy="4351338"/>
+            <a:ext cx="5659768" cy="4425132"/>
           </a:xfrm>
         </p:spPr>
         <p:txBody>
@@ -15228,275 +15126,156 @@
           </a:bodyPr>
           <a:lstStyle/>
           <a:p>
-            <a:pPr marL="0" indent="0">
-              <a:buNone/>
+            <a:pPr marL="342900" indent="-457200">
+              <a:buAutoNum type="arabicPeriod"/>
             </a:pPr>
             <a:r>
-              <a:rPr lang="en-US" sz="2400" u="sng" dirty="0">
-                <a:ea typeface="+mn-lt"/>
-                <a:cs typeface="+mn-lt"/>
-              </a:rPr>
-              <a:t>Comparing both the models:</a:t>
-            </a:r>
-          </a:p>
-          <a:p>
-            <a:r>
-              <a:rPr lang="en-US" sz="2400" dirty="0">
-                <a:ea typeface="+mn-lt"/>
-                <a:cs typeface="+mn-lt"/>
-              </a:rPr>
-              <a:t>There is an increase in F1 score of </a:t>
-            </a:r>
-            <a:r>
-              <a:rPr lang="en-US" sz="2400" b="1" dirty="0">
-                <a:ea typeface="+mn-lt"/>
-                <a:cs typeface="+mn-lt"/>
-              </a:rPr>
-              <a:t>3% </a:t>
-            </a:r>
-            <a:r>
-              <a:rPr lang="en-US" sz="2400" dirty="0">
-                <a:ea typeface="+mn-lt"/>
-                <a:cs typeface="+mn-lt"/>
-              </a:rPr>
-              <a:t>for positive examples and </a:t>
-            </a:r>
-            <a:r>
-              <a:rPr lang="en-US" sz="2400" b="1" dirty="0">
-                <a:ea typeface="+mn-lt"/>
-                <a:cs typeface="+mn-lt"/>
-              </a:rPr>
-              <a:t>6% </a:t>
-            </a:r>
-            <a:r>
-              <a:rPr lang="en-US" sz="2400" dirty="0">
-                <a:ea typeface="+mn-lt"/>
-                <a:cs typeface="+mn-lt"/>
-              </a:rPr>
-              <a:t>for negative examples after optimization.</a:t>
-            </a:r>
-          </a:p>
-          <a:p>
-            <a:r>
-              <a:rPr lang="en-US" sz="2400" dirty="0">
-                <a:ea typeface="+mn-lt"/>
-                <a:cs typeface="+mn-lt"/>
-              </a:rPr>
-              <a:t>The optimized model observed the </a:t>
-            </a:r>
-            <a:r>
-              <a:rPr lang="en-US" sz="2400" dirty="0">
-                <a:highlight>
-                  <a:srgbClr val="00FFFF"/>
-                </a:highlight>
-                <a:ea typeface="+mn-lt"/>
-                <a:cs typeface="+mn-lt"/>
-              </a:rPr>
-              <a:t>highest increase </a:t>
-            </a:r>
-            <a:r>
-              <a:rPr lang="en-US" sz="2400" dirty="0">
-                <a:ea typeface="+mn-lt"/>
-                <a:cs typeface="+mn-lt"/>
-              </a:rPr>
-              <a:t>in recall for positive examples. This can also be seen by observing the false positive example in the confusion matrix</a:t>
-            </a:r>
-          </a:p>
-          <a:p>
-            <a:pPr lvl="1"/>
+              <a:rPr lang="en-US" sz="2100" dirty="0"/>
+              <a:t>Only two hyperparameters were used to create the optimized model: the regularization parameter </a:t>
+            </a:r>
+            <a:r>
+              <a:rPr lang="en-US" sz="2100" i="1" dirty="0"/>
+              <a:t>C </a:t>
+            </a:r>
+            <a:r>
+              <a:rPr lang="en-US" sz="2100" dirty="0"/>
+              <a:t>and </a:t>
+            </a:r>
+            <a:r>
+              <a:rPr lang="en-US" sz="2100" i="1" dirty="0"/>
+              <a:t>penalty</a:t>
+            </a:r>
+            <a:r>
+              <a:rPr lang="en-US" sz="2100" dirty="0"/>
+              <a:t>.</a:t>
+            </a:r>
+          </a:p>
+          <a:p>
+            <a:pPr marL="342900" indent="-457200">
+              <a:buAutoNum type="arabicPeriod"/>
+            </a:pPr>
+            <a:r>
+              <a:rPr lang="en-US" sz="2100" dirty="0"/>
+              <a:t>Other hyperparameters (</a:t>
+            </a:r>
+            <a:r>
+              <a:rPr lang="en-US" sz="2100" i="1" dirty="0"/>
+              <a:t>solver</a:t>
+            </a:r>
+            <a:r>
+              <a:rPr lang="en-US" sz="2100" dirty="0"/>
+              <a:t>, </a:t>
+            </a:r>
+            <a:r>
+              <a:rPr lang="en-US" sz="2100" i="1" dirty="0" err="1"/>
+              <a:t>class_weight</a:t>
+            </a:r>
+            <a:r>
+              <a:rPr lang="en-US" sz="2100" dirty="0"/>
+              <a:t>) were predefined. Using the `</a:t>
+            </a:r>
+            <a:r>
+              <a:rPr lang="en-US" sz="2100" i="1" dirty="0" err="1"/>
+              <a:t>lbfgs</a:t>
+            </a:r>
+            <a:r>
+              <a:rPr lang="en-US" sz="2100" dirty="0"/>
+              <a:t>` solver limits the penalty norm to `I2`. Therefore, the only hyperparameter that was varied was </a:t>
+            </a:r>
+            <a:r>
+              <a:rPr lang="en-US" sz="2100" i="1" dirty="0"/>
+              <a:t>C.</a:t>
+            </a:r>
+          </a:p>
+          <a:p>
+            <a:pPr marL="342900" indent="-457200">
+              <a:buAutoNum type="arabicPeriod"/>
+            </a:pPr>
+            <a:r>
+              <a:rPr lang="en-US" sz="2100" dirty="0"/>
+              <a:t>Varying only </a:t>
+            </a:r>
+            <a:r>
+              <a:rPr lang="en-US" sz="2100" i="1" dirty="0"/>
+              <a:t>C </a:t>
+            </a:r>
+            <a:r>
+              <a:rPr lang="en-US" sz="2100" dirty="0"/>
+              <a:t>brought about </a:t>
+            </a:r>
+            <a:r>
+              <a:rPr lang="en-US" sz="2100" b="1" dirty="0"/>
+              <a:t>no </a:t>
+            </a:r>
+            <a:r>
+              <a:rPr lang="en-US" sz="2100" dirty="0"/>
+              <a:t>significant </a:t>
+            </a:r>
             <a:r>
               <a:rPr lang="en-US" sz="2000" dirty="0">
                 <a:ea typeface="+mn-lt"/>
                 <a:cs typeface="+mn-lt"/>
               </a:rPr>
-              <a:t>Standard model: 8 false positives (</a:t>
-            </a:r>
-            <a:r>
-              <a:rPr lang="en-US" sz="2000" dirty="0">
-                <a:solidFill>
-                  <a:srgbClr val="002060"/>
-                </a:solidFill>
-                <a:ea typeface="+mn-lt"/>
-                <a:cs typeface="+mn-lt"/>
-              </a:rPr>
-              <a:t>62% recall</a:t>
-            </a:r>
+              <a:t>improvements in the model’s performance. This shows that the model’s performance does not improve with changing increasing regularization. This reduces the possibility of the model overfitting the dataset.</a:t>
+            </a:r>
+          </a:p>
+          <a:p>
+            <a:pPr marL="342900" indent="-457200">
+              <a:buAutoNum type="arabicPeriod"/>
+            </a:pPr>
             <a:r>
               <a:rPr lang="en-US" sz="2000" dirty="0">
                 <a:ea typeface="+mn-lt"/>
                 <a:cs typeface="+mn-lt"/>
               </a:rPr>
-              <a:t>)</a:t>
-            </a:r>
-          </a:p>
-          <a:p>
-            <a:pPr lvl="1"/>
-            <a:r>
-              <a:rPr lang="en-US" sz="2000" dirty="0">
-                <a:ea typeface="+mn-lt"/>
-                <a:cs typeface="+mn-lt"/>
-              </a:rPr>
-              <a:t>Optimized model: 6 false positives (</a:t>
-            </a:r>
-            <a:r>
-              <a:rPr lang="en-US" sz="2000" dirty="0">
-                <a:solidFill>
-                  <a:srgbClr val="002060"/>
-                </a:solidFill>
-                <a:ea typeface="+mn-lt"/>
-                <a:cs typeface="+mn-lt"/>
-              </a:rPr>
-              <a:t>71% recall</a:t>
-            </a:r>
-            <a:r>
-              <a:rPr lang="en-US" sz="2000" dirty="0">
-                <a:ea typeface="+mn-lt"/>
-                <a:cs typeface="+mn-lt"/>
-              </a:rPr>
-              <a:t>)</a:t>
-            </a:r>
-          </a:p>
-          <a:p>
-            <a:r>
-              <a:rPr lang="en-US" sz="2400" dirty="0">
-                <a:ea typeface="+mn-lt"/>
-                <a:cs typeface="+mn-lt"/>
-              </a:rPr>
-              <a:t>On the other hand, the recall for negative examples as </a:t>
-            </a:r>
-            <a:r>
-              <a:rPr lang="en-US" sz="2400" b="1" dirty="0">
-                <a:ea typeface="+mn-lt"/>
-                <a:cs typeface="+mn-lt"/>
-              </a:rPr>
-              <a:t>not changed</a:t>
-            </a:r>
-            <a:r>
-              <a:rPr lang="en-US" sz="2400" dirty="0">
-                <a:ea typeface="+mn-lt"/>
-                <a:cs typeface="+mn-lt"/>
-              </a:rPr>
-              <a:t>. This can be observed from the confusion matrices as well.</a:t>
-            </a:r>
-          </a:p>
-          <a:p>
-            <a:pPr lvl="1"/>
-            <a:r>
-              <a:rPr lang="en-US" sz="2000" dirty="0">
-                <a:ea typeface="+mn-lt"/>
-                <a:cs typeface="+mn-lt"/>
-              </a:rPr>
-              <a:t>Standard model: 8 false negatives (79%)</a:t>
-            </a:r>
-          </a:p>
-          <a:p>
-            <a:pPr lvl="1"/>
-            <a:r>
-              <a:rPr lang="en-US" sz="2000" dirty="0">
-                <a:ea typeface="+mn-lt"/>
-                <a:cs typeface="+mn-lt"/>
-              </a:rPr>
-              <a:t>Optimized model: 8 false negatives (79%)</a:t>
-            </a:r>
-          </a:p>
-          <a:p>
-            <a:r>
-              <a:rPr lang="en-US" sz="2400" dirty="0">
-                <a:ea typeface="+mn-lt"/>
-                <a:cs typeface="+mn-lt"/>
-              </a:rPr>
-              <a:t>Precision values have significantly improved for both the classes.</a:t>
-            </a:r>
-          </a:p>
-          <a:p>
-            <a:pPr lvl="1"/>
+              <a:t>Note: </a:t>
+            </a:r>
+            <a:r>
+              <a:rPr lang="en-US" sz="2000" dirty="0"/>
+              <a:t>The evidence of overfitting deciphered from the learning curve does not seem to be a concern.</a:t>
+            </a:r>
             <a:endParaRPr lang="en-US" sz="2000" dirty="0">
               <a:ea typeface="+mn-lt"/>
               <a:cs typeface="+mn-lt"/>
             </a:endParaRPr>
           </a:p>
           <a:p>
-            <a:pPr lvl="1"/>
-            <a:endParaRPr lang="en-US" sz="2000" dirty="0">
-              <a:ea typeface="+mn-lt"/>
-              <a:cs typeface="+mn-lt"/>
-            </a:endParaRPr>
-          </a:p>
-        </p:txBody>
-      </p:sp>
-      <p:pic>
-        <p:nvPicPr>
-          <p:cNvPr id="4" name="Picture 3">
-            <a:extLst>
-              <a:ext uri="{FF2B5EF4-FFF2-40B4-BE49-F238E27FC236}">
-                <a16:creationId xmlns:a16="http://schemas.microsoft.com/office/drawing/2014/main" id="{B5AF722A-B556-4A78-B5BA-B61ADC7A3E8F}"/>
-              </a:ext>
-            </a:extLst>
-          </p:cNvPr>
-          <p:cNvPicPr>
-            <a:picLocks noChangeAspect="1"/>
-          </p:cNvPicPr>
-          <p:nvPr/>
-        </p:nvPicPr>
-        <p:blipFill>
-          <a:blip r:embed="rId3"/>
-          <a:srcRect/>
-          <a:stretch/>
-        </p:blipFill>
-        <p:spPr>
-          <a:xfrm>
-            <a:off x="6030693" y="3109162"/>
-            <a:ext cx="5775826" cy="3412543"/>
-          </a:xfrm>
-          <a:custGeom>
-            <a:avLst/>
-            <a:gdLst/>
-            <a:ahLst/>
-            <a:cxnLst/>
-            <a:rect l="l" t="t" r="r" b="b"/>
-            <a:pathLst>
-              <a:path w="4438338" h="2323972">
-                <a:moveTo>
-                  <a:pt x="69905" y="0"/>
-                </a:moveTo>
-                <a:lnTo>
-                  <a:pt x="4368433" y="0"/>
-                </a:lnTo>
-                <a:cubicBezTo>
-                  <a:pt x="4407040" y="0"/>
-                  <a:pt x="4438338" y="31298"/>
-                  <a:pt x="4438338" y="69905"/>
-                </a:cubicBezTo>
-                <a:lnTo>
-                  <a:pt x="4438338" y="2254067"/>
-                </a:lnTo>
-                <a:cubicBezTo>
-                  <a:pt x="4438338" y="2292674"/>
-                  <a:pt x="4407040" y="2323972"/>
-                  <a:pt x="4368433" y="2323972"/>
-                </a:cubicBezTo>
-                <a:lnTo>
-                  <a:pt x="69905" y="2323972"/>
-                </a:lnTo>
-                <a:cubicBezTo>
-                  <a:pt x="31298" y="2323972"/>
-                  <a:pt x="0" y="2292674"/>
-                  <a:pt x="0" y="2254067"/>
-                </a:cubicBezTo>
-                <a:lnTo>
-                  <a:pt x="0" y="69905"/>
-                </a:lnTo>
-                <a:cubicBezTo>
-                  <a:pt x="0" y="31298"/>
-                  <a:pt x="31298" y="0"/>
-                  <a:pt x="69905" y="0"/>
-                </a:cubicBezTo>
-                <a:close/>
-              </a:path>
-            </a:pathLst>
-          </a:custGeom>
-        </p:spPr>
-      </p:pic>
+            <a:pPr marL="342900" indent="-457200">
+              <a:buAutoNum type="arabicPeriod"/>
+            </a:pPr>
+            <a:r>
+              <a:rPr lang="en-US" sz="2100" dirty="0"/>
+              <a:t>The </a:t>
+            </a:r>
+            <a:r>
+              <a:rPr lang="en-US" sz="2100" b="1" dirty="0"/>
+              <a:t>Area under the ROC</a:t>
+            </a:r>
+            <a:r>
+              <a:rPr lang="en-US" sz="2100" dirty="0"/>
+              <a:t> curve places the model’s accuracy at </a:t>
+            </a:r>
+            <a:r>
+              <a:rPr lang="en-US" sz="2100" b="1" dirty="0"/>
+              <a:t>78%</a:t>
+            </a:r>
+            <a:r>
+              <a:rPr lang="en-US" sz="2100" dirty="0"/>
+              <a:t>.</a:t>
+            </a:r>
+          </a:p>
+          <a:p>
+            <a:pPr marL="342900" indent="-457200">
+              <a:buFont typeface="Arial" panose="020B0604020202020204" pitchFamily="34" charset="0"/>
+              <a:buAutoNum type="arabicPeriod"/>
+            </a:pPr>
+            <a:r>
+              <a:rPr lang="en-US" sz="2100" dirty="0"/>
+              <a:t>Considering the dataset is imbalanced, the ROC curve does not provide a complete picture of the model’s performance. The ROC curve would provide a better indication of how well the model is doing if it could break down the model’s performance into positive and negative examples, separately (into two different ROC curves). </a:t>
+            </a:r>
+          </a:p>
+        </p:txBody>
+      </p:sp>
       <p:sp>
         <p:nvSpPr>
           <p:cNvPr id="60" name="Freeform: Shape 59">
@@ -15677,934 +15456,8 @@
           <p:nvPr/>
         </p:nvPicPr>
         <p:blipFill>
-          <a:blip r:embed="rId4"/>
-          <a:srcRect/>
-          <a:stretch/>
-        </p:blipFill>
-        <p:spPr>
-          <a:xfrm>
-            <a:off x="7152938" y="960229"/>
-            <a:ext cx="5036014" cy="2065769"/>
-          </a:xfrm>
-          <a:custGeom>
-            <a:avLst/>
-            <a:gdLst/>
-            <a:ahLst/>
-            <a:cxnLst/>
-            <a:rect l="l" t="t" r="r" b="b"/>
-            <a:pathLst>
-              <a:path w="4555700" h="2733294">
-                <a:moveTo>
-                  <a:pt x="82217" y="0"/>
-                </a:moveTo>
-                <a:lnTo>
-                  <a:pt x="4473483" y="0"/>
-                </a:lnTo>
-                <a:cubicBezTo>
-                  <a:pt x="4518890" y="0"/>
-                  <a:pt x="4555700" y="36810"/>
-                  <a:pt x="4555700" y="82217"/>
-                </a:cubicBezTo>
-                <a:lnTo>
-                  <a:pt x="4555700" y="2651077"/>
-                </a:lnTo>
-                <a:cubicBezTo>
-                  <a:pt x="4555700" y="2696484"/>
-                  <a:pt x="4518890" y="2733294"/>
-                  <a:pt x="4473483" y="2733294"/>
-                </a:cubicBezTo>
-                <a:lnTo>
-                  <a:pt x="82217" y="2733294"/>
-                </a:lnTo>
-                <a:cubicBezTo>
-                  <a:pt x="36810" y="2733294"/>
-                  <a:pt x="0" y="2696484"/>
-                  <a:pt x="0" y="2651077"/>
-                </a:cubicBezTo>
-                <a:lnTo>
-                  <a:pt x="0" y="82217"/>
-                </a:lnTo>
-                <a:cubicBezTo>
-                  <a:pt x="0" y="36810"/>
-                  <a:pt x="36810" y="0"/>
-                  <a:pt x="82217" y="0"/>
-                </a:cubicBezTo>
-                <a:close/>
-              </a:path>
-            </a:pathLst>
-          </a:custGeom>
-        </p:spPr>
-      </p:pic>
-      <p:sp>
-        <p:nvSpPr>
-          <p:cNvPr id="62" name="Arc 61">
-            <a:extLst>
-              <a:ext uri="{FF2B5EF4-FFF2-40B4-BE49-F238E27FC236}">
-                <a16:creationId xmlns:a16="http://schemas.microsoft.com/office/drawing/2014/main" id="{533DF362-939D-4EEE-8DC4-6B54607E5611}"/>
-              </a:ext>
-              <a:ext uri="{C183D7F6-B498-43B3-948B-1728B52AA6E4}">
-                <adec:decorative xmlns:adec="http://schemas.microsoft.com/office/drawing/2017/decorative" val="1"/>
-              </a:ext>
-            </a:extLst>
-          </p:cNvPr>
-          <p:cNvSpPr>
-            <a:spLocks noGrp="1" noRot="1" noChangeAspect="1" noMove="1" noResize="1" noEditPoints="1" noAdjustHandles="1" noChangeArrowheads="1" noChangeShapeType="1" noTextEdit="1"/>
-          </p:cNvSpPr>
-          <p:nvPr>
-            <p:extLst>
-              <p:ext uri="{386F3935-93C4-4BCD-93E2-E3B085C9AB24}">
-                <p16:designElem xmlns:p16="http://schemas.microsoft.com/office/powerpoint/2015/main" val="1"/>
-              </p:ext>
-            </p:extLst>
-          </p:nvPr>
-        </p:nvSpPr>
-        <p:spPr>
-          <a:xfrm rot="20504802" flipH="1">
-            <a:off x="6443172" y="162676"/>
-            <a:ext cx="4083433" cy="4083433"/>
-          </a:xfrm>
-          <a:prstGeom prst="arc">
-            <a:avLst>
-              <a:gd name="adj1" fmla="val 17445962"/>
-              <a:gd name="adj2" fmla="val 0"/>
-            </a:avLst>
-          </a:prstGeom>
-          <a:ln w="127000" cap="rnd">
-            <a:solidFill>
-              <a:schemeClr val="accent4"/>
-            </a:solidFill>
-            <a:prstDash val="dash"/>
-          </a:ln>
-        </p:spPr>
-        <p:style>
-          <a:lnRef idx="1">
-            <a:schemeClr val="accent1"/>
-          </a:lnRef>
-          <a:fillRef idx="0">
-            <a:schemeClr val="accent1"/>
-          </a:fillRef>
-          <a:effectRef idx="0">
-            <a:schemeClr val="accent1"/>
-          </a:effectRef>
-          <a:fontRef idx="minor">
-            <a:schemeClr val="tx1"/>
-          </a:fontRef>
-        </p:style>
-        <p:txBody>
-          <a:bodyPr rtlCol="0" anchor="ctr"/>
-          <a:lstStyle/>
-          <a:p>
-            <a:pPr marL="0" marR="0" lvl="0" indent="0" algn="ctr" defTabSz="914400" rtl="0" eaLnBrk="1" fontAlgn="auto" latinLnBrk="0" hangingPunct="1">
-              <a:lnSpc>
-                <a:spcPct val="100000"/>
-              </a:lnSpc>
-              <a:spcBef>
-                <a:spcPts val="0"/>
-              </a:spcBef>
-              <a:spcAft>
-                <a:spcPts val="0"/>
-              </a:spcAft>
-              <a:buClrTx/>
-              <a:buSzTx/>
-              <a:buFontTx/>
-              <a:buNone/>
-              <a:tabLst/>
-              <a:defRPr/>
-            </a:pPr>
-            <a:endParaRPr kumimoji="0" lang="en-US" sz="1800" b="0" i="0" u="none" strike="noStrike" kern="1200" cap="none" spc="0" normalizeH="0" baseline="0" noProof="0" dirty="0">
-              <a:ln>
-                <a:noFill/>
-              </a:ln>
-              <a:solidFill>
-                <a:prstClr val="black"/>
-              </a:solidFill>
-              <a:effectLst/>
-              <a:uLnTx/>
-              <a:uFillTx/>
-              <a:latin typeface="Calibri" panose="020F0502020204030204"/>
-              <a:ea typeface="+mn-ea"/>
-              <a:cs typeface="+mn-cs"/>
-            </a:endParaRPr>
-          </a:p>
-        </p:txBody>
-      </p:sp>
-      <p:sp>
-        <p:nvSpPr>
-          <p:cNvPr id="13" name="Footer Placeholder 12">
-            <a:extLst>
-              <a:ext uri="{FF2B5EF4-FFF2-40B4-BE49-F238E27FC236}">
-                <a16:creationId xmlns:a16="http://schemas.microsoft.com/office/drawing/2014/main" id="{34CB8358-5219-419E-B50C-A279EA3E635F}"/>
-              </a:ext>
-            </a:extLst>
-          </p:cNvPr>
-          <p:cNvSpPr>
-            <a:spLocks noGrp="1"/>
-          </p:cNvSpPr>
-          <p:nvPr>
-            <p:ph type="ftr" sz="quarter" idx="11"/>
-          </p:nvPr>
-        </p:nvSpPr>
-        <p:spPr>
-          <a:xfrm>
-            <a:off x="4038600" y="6356350"/>
-            <a:ext cx="4114800" cy="365125"/>
-          </a:xfrm>
-        </p:spPr>
-        <p:txBody>
-          <a:bodyPr rtlCol="0">
-            <a:normAutofit/>
-          </a:bodyPr>
-          <a:lstStyle/>
-          <a:p>
-            <a:pPr>
-              <a:defRPr/>
-            </a:pPr>
-            <a:r>
-              <a:rPr lang="en-GB" dirty="0">
-                <a:solidFill>
-                  <a:prstClr val="black">
-                    <a:tint val="75000"/>
-                  </a:prstClr>
-                </a:solidFill>
-              </a:rPr>
-              <a:t>Logistical Regression</a:t>
-            </a:r>
-          </a:p>
-        </p:txBody>
-      </p:sp>
-      <p:sp>
-        <p:nvSpPr>
-          <p:cNvPr id="14" name="Slide Number Placeholder 13">
-            <a:extLst>
-              <a:ext uri="{FF2B5EF4-FFF2-40B4-BE49-F238E27FC236}">
-                <a16:creationId xmlns:a16="http://schemas.microsoft.com/office/drawing/2014/main" id="{8A5B9DFF-1E65-43C9-B2DE-90CD91DFAE1A}"/>
-              </a:ext>
-            </a:extLst>
-          </p:cNvPr>
-          <p:cNvSpPr>
-            <a:spLocks noGrp="1"/>
-          </p:cNvSpPr>
-          <p:nvPr>
-            <p:ph type="sldNum" sz="quarter" idx="12"/>
-          </p:nvPr>
-        </p:nvSpPr>
-        <p:spPr>
-          <a:xfrm>
-            <a:off x="8610600" y="6356350"/>
-            <a:ext cx="2743200" cy="365125"/>
-          </a:xfrm>
-        </p:spPr>
-        <p:txBody>
-          <a:bodyPr rtlCol="0">
-            <a:normAutofit/>
-          </a:bodyPr>
-          <a:lstStyle/>
-          <a:p>
-            <a:pPr lvl="0" rtl="0">
-              <a:spcAft>
-                <a:spcPts val="600"/>
-              </a:spcAft>
-            </a:pPr>
-            <a:fld id="{D76B855D-E9CC-4FF8-AD85-6CDC7B89A0DE}" type="slidenum">
-              <a:rPr lang="en-GB">
-                <a:solidFill>
-                  <a:prstClr val="black">
-                    <a:tint val="75000"/>
-                  </a:prstClr>
-                </a:solidFill>
-              </a:rPr>
-              <a:pPr lvl="0" rtl="0">
-                <a:spcAft>
-                  <a:spcPts val="600"/>
-                </a:spcAft>
-              </a:pPr>
-              <a:t>7</a:t>
-            </a:fld>
-            <a:endParaRPr lang="en-GB">
-              <a:solidFill>
-                <a:prstClr val="black">
-                  <a:tint val="75000"/>
-                </a:prstClr>
-              </a:solidFill>
-            </a:endParaRPr>
-          </a:p>
-        </p:txBody>
-      </p:sp>
-      <p:sp>
-        <p:nvSpPr>
-          <p:cNvPr id="5" name="Oval 4">
-            <a:extLst>
-              <a:ext uri="{FF2B5EF4-FFF2-40B4-BE49-F238E27FC236}">
-                <a16:creationId xmlns:a16="http://schemas.microsoft.com/office/drawing/2014/main" id="{52691611-4AED-1841-96DA-22251D2195D5}"/>
-              </a:ext>
-            </a:extLst>
-          </p:cNvPr>
-          <p:cNvSpPr/>
-          <p:nvPr/>
-        </p:nvSpPr>
-        <p:spPr>
-          <a:xfrm>
-            <a:off x="9670945" y="1970254"/>
-            <a:ext cx="556260" cy="236067"/>
-          </a:xfrm>
-          <a:prstGeom prst="ellipse">
-            <a:avLst/>
-          </a:prstGeom>
-          <a:solidFill>
-            <a:schemeClr val="accent4">
-              <a:lumMod val="60000"/>
-              <a:lumOff val="40000"/>
-              <a:alpha val="20000"/>
-            </a:schemeClr>
-          </a:solidFill>
-          <a:ln>
-            <a:solidFill>
-              <a:srgbClr val="002060"/>
-            </a:solidFill>
-          </a:ln>
-        </p:spPr>
-        <p:style>
-          <a:lnRef idx="2">
-            <a:schemeClr val="accent6"/>
-          </a:lnRef>
-          <a:fillRef idx="1">
-            <a:schemeClr val="lt1"/>
-          </a:fillRef>
-          <a:effectRef idx="0">
-            <a:schemeClr val="accent6"/>
-          </a:effectRef>
-          <a:fontRef idx="minor">
-            <a:schemeClr val="dk1"/>
-          </a:fontRef>
-        </p:style>
-        <p:txBody>
-          <a:bodyPr rtlCol="0" anchor="ctr"/>
-          <a:lstStyle/>
-          <a:p>
-            <a:pPr algn="ctr"/>
-            <a:endParaRPr lang="en-US"/>
-          </a:p>
-        </p:txBody>
-      </p:sp>
-      <p:sp>
-        <p:nvSpPr>
-          <p:cNvPr id="12" name="Oval 11">
-            <a:extLst>
-              <a:ext uri="{FF2B5EF4-FFF2-40B4-BE49-F238E27FC236}">
-                <a16:creationId xmlns:a16="http://schemas.microsoft.com/office/drawing/2014/main" id="{6144CC81-7FEA-5347-B433-F5E62830341A}"/>
-              </a:ext>
-            </a:extLst>
-          </p:cNvPr>
-          <p:cNvSpPr/>
-          <p:nvPr/>
-        </p:nvSpPr>
-        <p:spPr>
-          <a:xfrm>
-            <a:off x="8241048" y="4854611"/>
-            <a:ext cx="492198" cy="208880"/>
-          </a:xfrm>
-          <a:prstGeom prst="ellipse">
-            <a:avLst/>
-          </a:prstGeom>
-          <a:solidFill>
-            <a:schemeClr val="accent4">
-              <a:lumMod val="60000"/>
-              <a:lumOff val="40000"/>
-              <a:alpha val="20000"/>
-            </a:schemeClr>
-          </a:solidFill>
-          <a:ln>
-            <a:solidFill>
-              <a:srgbClr val="002060"/>
-            </a:solidFill>
-          </a:ln>
-        </p:spPr>
-        <p:style>
-          <a:lnRef idx="2">
-            <a:schemeClr val="accent6"/>
-          </a:lnRef>
-          <a:fillRef idx="1">
-            <a:schemeClr val="lt1"/>
-          </a:fillRef>
-          <a:effectRef idx="0">
-            <a:schemeClr val="accent6"/>
-          </a:effectRef>
-          <a:fontRef idx="minor">
-            <a:schemeClr val="dk1"/>
-          </a:fontRef>
-        </p:style>
-        <p:txBody>
-          <a:bodyPr rtlCol="0" anchor="ctr"/>
-          <a:lstStyle/>
-          <a:p>
-            <a:pPr algn="ctr"/>
-            <a:endParaRPr lang="en-US"/>
-          </a:p>
-        </p:txBody>
-      </p:sp>
-    </p:spTree>
-    <p:extLst>
-      <p:ext uri="{BB962C8B-B14F-4D97-AF65-F5344CB8AC3E}">
-        <p14:creationId xmlns:p14="http://schemas.microsoft.com/office/powerpoint/2010/main" val="3163893337"/>
-      </p:ext>
-    </p:extLst>
-  </p:cSld>
-  <p:clrMapOvr>
-    <a:masterClrMapping/>
-  </p:clrMapOvr>
-</p:sld>
-</file>
-
-<file path=ppt/slides/slide8.xml><?xml version="1.0" encoding="utf-8"?>
-<p:sld xmlns:a="http://schemas.openxmlformats.org/drawingml/2006/main" xmlns:r="http://schemas.openxmlformats.org/officeDocument/2006/relationships" xmlns:p="http://schemas.openxmlformats.org/presentationml/2006/main">
-  <p:cSld>
-    <p:bg>
-      <p:bgPr>
-        <a:solidFill>
-          <a:schemeClr val="bg1"/>
-        </a:solidFill>
-        <a:effectLst/>
-      </p:bgPr>
-    </p:bg>
-    <p:spTree>
-      <p:nvGrpSpPr>
-        <p:cNvPr id="1" name=""/>
-        <p:cNvGrpSpPr/>
-        <p:nvPr/>
-      </p:nvGrpSpPr>
-      <p:grpSpPr>
-        <a:xfrm>
-          <a:off x="0" y="0"/>
-          <a:ext cx="0" cy="0"/>
-          <a:chOff x="0" y="0"/>
-          <a:chExt cx="0" cy="0"/>
-        </a:xfrm>
-      </p:grpSpPr>
-      <p:sp useBgFill="1">
-        <p:nvSpPr>
-          <p:cNvPr id="58" name="Rectangle 57">
-            <a:extLst>
-              <a:ext uri="{FF2B5EF4-FFF2-40B4-BE49-F238E27FC236}">
-                <a16:creationId xmlns:a16="http://schemas.microsoft.com/office/drawing/2014/main" id="{53E60C6D-4E85-4E14-BCDF-BF15C241F7CA}"/>
-              </a:ext>
-              <a:ext uri="{C183D7F6-B498-43B3-948B-1728B52AA6E4}">
-                <adec:decorative xmlns:adec="http://schemas.microsoft.com/office/drawing/2017/decorative" val="1"/>
-              </a:ext>
-            </a:extLst>
-          </p:cNvPr>
-          <p:cNvSpPr>
-            <a:spLocks noGrp="1" noRot="1" noChangeAspect="1" noMove="1" noResize="1" noEditPoints="1" noAdjustHandles="1" noChangeArrowheads="1" noChangeShapeType="1" noTextEdit="1"/>
-          </p:cNvSpPr>
-          <p:nvPr>
-            <p:extLst>
-              <p:ext uri="{386F3935-93C4-4BCD-93E2-E3B085C9AB24}">
-                <p16:designElem xmlns:p16="http://schemas.microsoft.com/office/powerpoint/2015/main" val="1"/>
-              </p:ext>
-            </p:extLst>
-          </p:nvPr>
-        </p:nvSpPr>
-        <p:spPr>
-          <a:xfrm>
-            <a:off x="0" y="0"/>
-            <a:ext cx="12188952" cy="6858000"/>
-          </a:xfrm>
-          <a:prstGeom prst="rect">
-            <a:avLst/>
-          </a:prstGeom>
-          <a:ln>
-            <a:noFill/>
-          </a:ln>
-        </p:spPr>
-        <p:style>
-          <a:lnRef idx="2">
-            <a:schemeClr val="accent1">
-              <a:shade val="50000"/>
-            </a:schemeClr>
-          </a:lnRef>
-          <a:fillRef idx="1">
-            <a:schemeClr val="accent1"/>
-          </a:fillRef>
-          <a:effectRef idx="0">
-            <a:schemeClr val="accent1"/>
-          </a:effectRef>
-          <a:fontRef idx="minor">
-            <a:schemeClr val="lt1"/>
-          </a:fontRef>
-        </p:style>
-        <p:txBody>
-          <a:bodyPr rtlCol="0" anchor="ctr"/>
-          <a:lstStyle/>
-          <a:p>
-            <a:pPr marL="0" marR="0" lvl="0" indent="0" algn="ctr" defTabSz="914400" rtl="0" eaLnBrk="1" fontAlgn="auto" latinLnBrk="0" hangingPunct="1">
-              <a:lnSpc>
-                <a:spcPct val="100000"/>
-              </a:lnSpc>
-              <a:spcBef>
-                <a:spcPts val="0"/>
-              </a:spcBef>
-              <a:spcAft>
-                <a:spcPts val="0"/>
-              </a:spcAft>
-              <a:buClrTx/>
-              <a:buSzTx/>
-              <a:buFontTx/>
-              <a:buNone/>
-              <a:tabLst/>
-              <a:defRPr/>
-            </a:pPr>
-            <a:endParaRPr kumimoji="0" lang="en-US" sz="1800" b="0" i="0" u="none" strike="noStrike" kern="1200" cap="none" spc="0" normalizeH="0" baseline="0" noProof="0">
-              <a:ln>
-                <a:noFill/>
-              </a:ln>
-              <a:solidFill>
-                <a:prstClr val="white"/>
-              </a:solidFill>
-              <a:effectLst/>
-              <a:uLnTx/>
-              <a:uFillTx/>
-              <a:latin typeface="Calibri" panose="020F0502020204030204"/>
-              <a:ea typeface="+mn-ea"/>
-              <a:cs typeface="+mn-cs"/>
-            </a:endParaRPr>
-          </a:p>
-        </p:txBody>
-      </p:sp>
-      <p:sp>
-        <p:nvSpPr>
-          <p:cNvPr id="9" name="Title 1">
-            <a:extLst>
-              <a:ext uri="{FF2B5EF4-FFF2-40B4-BE49-F238E27FC236}">
-                <a16:creationId xmlns:a16="http://schemas.microsoft.com/office/drawing/2014/main" id="{78260B10-25FE-445D-A9FD-06B618F1B961}"/>
-              </a:ext>
-            </a:extLst>
-          </p:cNvPr>
-          <p:cNvSpPr>
-            <a:spLocks noGrp="1"/>
-          </p:cNvSpPr>
-          <p:nvPr>
-            <p:ph type="title"/>
-          </p:nvPr>
-        </p:nvSpPr>
-        <p:spPr>
-          <a:xfrm>
-            <a:off x="633456" y="486184"/>
-            <a:ext cx="5397237" cy="1325563"/>
-          </a:xfrm>
-        </p:spPr>
-        <p:txBody>
-          <a:bodyPr rtlCol="0">
-            <a:noAutofit/>
-          </a:bodyPr>
-          <a:lstStyle/>
-          <a:p>
-            <a:r>
-              <a:rPr lang="en-US" sz="3200" dirty="0"/>
-              <a:t>Optimized Model</a:t>
-            </a:r>
-            <a:br>
-              <a:rPr lang="en-US" sz="3200" dirty="0"/>
-            </a:br>
-            <a:r>
-              <a:rPr lang="en-US" sz="2400" dirty="0"/>
-              <a:t>Hyperparameters and the ROC Curve</a:t>
-            </a:r>
-            <a:endParaRPr lang="en-GB" sz="3200" dirty="0"/>
-          </a:p>
-        </p:txBody>
-      </p:sp>
-      <p:sp>
-        <p:nvSpPr>
-          <p:cNvPr id="3" name="Content Placeholder 2">
-            <a:extLst>
-              <a:ext uri="{FF2B5EF4-FFF2-40B4-BE49-F238E27FC236}">
-                <a16:creationId xmlns:a16="http://schemas.microsoft.com/office/drawing/2014/main" id="{2D77BDC5-1C01-4635-8464-9C6F649065B8}"/>
-              </a:ext>
-            </a:extLst>
-          </p:cNvPr>
-          <p:cNvSpPr>
-            <a:spLocks noGrp="1"/>
-          </p:cNvSpPr>
-          <p:nvPr>
-            <p:ph idx="1"/>
-          </p:nvPr>
-        </p:nvSpPr>
-        <p:spPr>
-          <a:xfrm>
-            <a:off x="633456" y="1946684"/>
-            <a:ext cx="5659768" cy="4425132"/>
-          </a:xfrm>
-        </p:spPr>
-        <p:txBody>
-          <a:bodyPr vert="horz" lIns="91440" tIns="45720" rIns="91440" bIns="45720" rtlCol="0" anchor="t">
-            <a:normAutofit fontScale="62500" lnSpcReduction="20000"/>
-          </a:bodyPr>
-          <a:lstStyle/>
-          <a:p>
-            <a:pPr marL="342900" indent="-457200">
-              <a:buAutoNum type="arabicPeriod"/>
-            </a:pPr>
-            <a:r>
-              <a:rPr lang="en-US" sz="2100" dirty="0"/>
-              <a:t>Only two hyperparameters were used to create the optimized model: the regularization parameter </a:t>
-            </a:r>
-            <a:r>
-              <a:rPr lang="en-US" sz="2100" i="1" dirty="0"/>
-              <a:t>C </a:t>
-            </a:r>
-            <a:r>
-              <a:rPr lang="en-US" sz="2100" dirty="0"/>
-              <a:t>and </a:t>
-            </a:r>
-            <a:r>
-              <a:rPr lang="en-US" sz="2100" i="1" dirty="0"/>
-              <a:t>penalty</a:t>
-            </a:r>
-            <a:r>
-              <a:rPr lang="en-US" sz="2100" dirty="0"/>
-              <a:t>.</a:t>
-            </a:r>
-          </a:p>
-          <a:p>
-            <a:pPr marL="342900" indent="-457200">
-              <a:buAutoNum type="arabicPeriod"/>
-            </a:pPr>
-            <a:r>
-              <a:rPr lang="en-US" sz="2100" dirty="0"/>
-              <a:t>Other hyperparameters (</a:t>
-            </a:r>
-            <a:r>
-              <a:rPr lang="en-US" sz="2100" i="1" dirty="0"/>
-              <a:t>solver</a:t>
-            </a:r>
-            <a:r>
-              <a:rPr lang="en-US" sz="2100" dirty="0"/>
-              <a:t>, </a:t>
-            </a:r>
-            <a:r>
-              <a:rPr lang="en-US" sz="2100" i="1" dirty="0" err="1"/>
-              <a:t>class_weight</a:t>
-            </a:r>
-            <a:r>
-              <a:rPr lang="en-US" sz="2100" dirty="0"/>
-              <a:t>) were predefined. Using the `</a:t>
-            </a:r>
-            <a:r>
-              <a:rPr lang="en-US" sz="2100" i="1" dirty="0" err="1"/>
-              <a:t>lbfgs</a:t>
-            </a:r>
-            <a:r>
-              <a:rPr lang="en-US" sz="2100" dirty="0"/>
-              <a:t>` solver limits the penalty norm to `I2`. Therefore, the only hyperparameter that was varied was </a:t>
-            </a:r>
-            <a:r>
-              <a:rPr lang="en-US" sz="2100" i="1" dirty="0"/>
-              <a:t>C.</a:t>
-            </a:r>
-          </a:p>
-          <a:p>
-            <a:pPr marL="342900" indent="-457200">
-              <a:buAutoNum type="arabicPeriod"/>
-            </a:pPr>
-            <a:r>
-              <a:rPr lang="en-US" sz="2100" dirty="0"/>
-              <a:t>Varying only </a:t>
-            </a:r>
-            <a:r>
-              <a:rPr lang="en-US" sz="2100" i="1" dirty="0"/>
-              <a:t>C </a:t>
-            </a:r>
-            <a:r>
-              <a:rPr lang="en-US" sz="2100" dirty="0"/>
-              <a:t>brought about some significant </a:t>
-            </a:r>
-            <a:r>
-              <a:rPr lang="en-US" sz="2000" dirty="0">
-                <a:ea typeface="+mn-lt"/>
-                <a:cs typeface="+mn-lt"/>
-              </a:rPr>
-              <a:t>improvements in the model’s performance. Namely, an increase in the F1 scores of </a:t>
-            </a:r>
-            <a:r>
-              <a:rPr lang="en-US" sz="2000" b="1" dirty="0">
-                <a:ea typeface="+mn-lt"/>
-                <a:cs typeface="+mn-lt"/>
-              </a:rPr>
-              <a:t>3% </a:t>
-            </a:r>
-            <a:r>
-              <a:rPr lang="en-US" sz="2000" dirty="0">
-                <a:ea typeface="+mn-lt"/>
-                <a:cs typeface="+mn-lt"/>
-              </a:rPr>
-              <a:t>for positive examples and </a:t>
-            </a:r>
-            <a:r>
-              <a:rPr lang="en-US" sz="2000" b="1" dirty="0">
-                <a:ea typeface="+mn-lt"/>
-                <a:cs typeface="+mn-lt"/>
-              </a:rPr>
-              <a:t>6% </a:t>
-            </a:r>
-            <a:r>
-              <a:rPr lang="en-US" sz="2000" dirty="0">
-                <a:ea typeface="+mn-lt"/>
-                <a:cs typeface="+mn-lt"/>
-              </a:rPr>
-              <a:t>for negative examples was observed.</a:t>
-            </a:r>
-          </a:p>
-          <a:p>
-            <a:pPr marL="342900" indent="-457200">
-              <a:buAutoNum type="arabicPeriod"/>
-            </a:pPr>
-            <a:r>
-              <a:rPr lang="en-US" sz="2100" dirty="0"/>
-              <a:t>The optimum value of </a:t>
-            </a:r>
-            <a:r>
-              <a:rPr lang="en-US" sz="2100" i="1" dirty="0"/>
-              <a:t>C </a:t>
-            </a:r>
-            <a:r>
-              <a:rPr lang="en-US" sz="2100" dirty="0"/>
-              <a:t>determined through grid search is `</a:t>
-            </a:r>
-            <a:r>
-              <a:rPr lang="en-US" sz="2100" b="1" dirty="0"/>
-              <a:t>0.01</a:t>
-            </a:r>
-            <a:r>
-              <a:rPr lang="en-US" sz="2100" dirty="0"/>
-              <a:t>`. The value reflects that a </a:t>
-            </a:r>
-            <a:r>
-              <a:rPr lang="en-US" sz="2100" b="1" dirty="0"/>
-              <a:t>high amount of regularization </a:t>
-            </a:r>
-            <a:r>
-              <a:rPr lang="en-US" sz="2100" dirty="0"/>
-              <a:t>is required to improve the model’s performance. Hence, the model is usually overfitting the dataset. The evidence of overfitting can be deciphered from the learning curve.</a:t>
-            </a:r>
-          </a:p>
-          <a:p>
-            <a:pPr marL="342900" indent="-457200">
-              <a:buAutoNum type="arabicPeriod"/>
-            </a:pPr>
-            <a:r>
-              <a:rPr lang="en-US" sz="2100" dirty="0"/>
-              <a:t>The </a:t>
-            </a:r>
-            <a:r>
-              <a:rPr lang="en-US" sz="2100" b="1" dirty="0"/>
-              <a:t>Area under the ROC</a:t>
-            </a:r>
-            <a:r>
-              <a:rPr lang="en-US" sz="2100" dirty="0"/>
-              <a:t> curve places the model’s accuracy at </a:t>
-            </a:r>
-            <a:r>
-              <a:rPr lang="en-US" sz="2100" b="1" dirty="0"/>
-              <a:t>75%</a:t>
-            </a:r>
-            <a:r>
-              <a:rPr lang="en-US" sz="2100" dirty="0"/>
-              <a:t>.</a:t>
-            </a:r>
-          </a:p>
-          <a:p>
-            <a:pPr marL="342900" indent="-457200">
-              <a:buFont typeface="Arial" panose="020B0604020202020204" pitchFamily="34" charset="0"/>
-              <a:buAutoNum type="arabicPeriod"/>
-            </a:pPr>
-            <a:r>
-              <a:rPr lang="en-US" sz="2100" dirty="0"/>
-              <a:t>Considering the dataset is imbalanced, the ROC curve does not provide a complete picture of the model’s performance. The ROC curve would provide a better indication of how well the model is doing if it could break down the model’s performance into positive and negative examples, separately (into two different ROC curves). </a:t>
-            </a:r>
-          </a:p>
-        </p:txBody>
-      </p:sp>
-      <p:sp>
-        <p:nvSpPr>
-          <p:cNvPr id="60" name="Freeform: Shape 59">
-            <a:extLst>
-              <a:ext uri="{FF2B5EF4-FFF2-40B4-BE49-F238E27FC236}">
-                <a16:creationId xmlns:a16="http://schemas.microsoft.com/office/drawing/2014/main" id="{7D42D292-4C48-479B-9E59-E29CD9871C0C}"/>
-              </a:ext>
-              <a:ext uri="{C183D7F6-B498-43B3-948B-1728B52AA6E4}">
-                <adec:decorative xmlns:adec="http://schemas.microsoft.com/office/drawing/2017/decorative" val="1"/>
-              </a:ext>
-            </a:extLst>
-          </p:cNvPr>
-          <p:cNvSpPr>
-            <a:spLocks noGrp="1" noRot="1" noChangeAspect="1" noMove="1" noResize="1" noEditPoints="1" noAdjustHandles="1" noChangeArrowheads="1" noChangeShapeType="1" noTextEdit="1"/>
-          </p:cNvSpPr>
-          <p:nvPr>
-            <p:extLst>
-              <p:ext uri="{386F3935-93C4-4BCD-93E2-E3B085C9AB24}">
-                <p16:designElem xmlns:p16="http://schemas.microsoft.com/office/powerpoint/2015/main" val="1"/>
-              </p:ext>
-            </p:extLst>
-          </p:nvPr>
-        </p:nvSpPr>
-        <p:spPr>
-          <a:xfrm>
-            <a:off x="9519137" y="5486400"/>
-            <a:ext cx="2672863" cy="1371600"/>
-          </a:xfrm>
-          <a:custGeom>
-            <a:avLst/>
-            <a:gdLst>
-              <a:gd name="connsiteX0" fmla="*/ 1721734 w 2672863"/>
-              <a:gd name="connsiteY0" fmla="*/ 0 h 1371600"/>
-              <a:gd name="connsiteX1" fmla="*/ 2564444 w 2672863"/>
-              <a:gd name="connsiteY1" fmla="*/ 213382 h 1371600"/>
-              <a:gd name="connsiteX2" fmla="*/ 2672863 w 2672863"/>
-              <a:gd name="connsiteY2" fmla="*/ 279248 h 1371600"/>
-              <a:gd name="connsiteX3" fmla="*/ 2672863 w 2672863"/>
-              <a:gd name="connsiteY3" fmla="*/ 1371600 h 1371600"/>
-              <a:gd name="connsiteX4" fmla="*/ 0 w 2672863"/>
-              <a:gd name="connsiteY4" fmla="*/ 1371600 h 1371600"/>
-              <a:gd name="connsiteX5" fmla="*/ 33268 w 2672863"/>
-              <a:gd name="connsiteY5" fmla="*/ 1242216 h 1371600"/>
-              <a:gd name="connsiteX6" fmla="*/ 1721734 w 2672863"/>
-              <a:gd name="connsiteY6" fmla="*/ 0 h 1371600"/>
-            </a:gdLst>
-            <a:ahLst/>
-            <a:cxnLst>
-              <a:cxn ang="0">
-                <a:pos x="connsiteX0" y="connsiteY0"/>
-              </a:cxn>
-              <a:cxn ang="0">
-                <a:pos x="connsiteX1" y="connsiteY1"/>
-              </a:cxn>
-              <a:cxn ang="0">
-                <a:pos x="connsiteX2" y="connsiteY2"/>
-              </a:cxn>
-              <a:cxn ang="0">
-                <a:pos x="connsiteX3" y="connsiteY3"/>
-              </a:cxn>
-              <a:cxn ang="0">
-                <a:pos x="connsiteX4" y="connsiteY4"/>
-              </a:cxn>
-              <a:cxn ang="0">
-                <a:pos x="connsiteX5" y="connsiteY5"/>
-              </a:cxn>
-              <a:cxn ang="0">
-                <a:pos x="connsiteX6" y="connsiteY6"/>
-              </a:cxn>
-            </a:cxnLst>
-            <a:rect l="l" t="t" r="r" b="b"/>
-            <a:pathLst>
-              <a:path w="2672863" h="1371600">
-                <a:moveTo>
-                  <a:pt x="1721734" y="0"/>
-                </a:moveTo>
-                <a:cubicBezTo>
-                  <a:pt x="2026863" y="0"/>
-                  <a:pt x="2313937" y="77299"/>
-                  <a:pt x="2564444" y="213382"/>
-                </a:cubicBezTo>
-                <a:lnTo>
-                  <a:pt x="2672863" y="279248"/>
-                </a:lnTo>
-                <a:lnTo>
-                  <a:pt x="2672863" y="1371600"/>
-                </a:lnTo>
-                <a:lnTo>
-                  <a:pt x="0" y="1371600"/>
-                </a:lnTo>
-                <a:lnTo>
-                  <a:pt x="33268" y="1242216"/>
-                </a:lnTo>
-                <a:cubicBezTo>
-                  <a:pt x="257110" y="522539"/>
-                  <a:pt x="928399" y="0"/>
-                  <a:pt x="1721734" y="0"/>
-                </a:cubicBezTo>
-                <a:close/>
-              </a:path>
-            </a:pathLst>
-          </a:custGeom>
-          <a:solidFill>
-            <a:schemeClr val="accent4"/>
-          </a:solidFill>
-          <a:ln>
-            <a:noFill/>
-          </a:ln>
-        </p:spPr>
-        <p:style>
-          <a:lnRef idx="2">
-            <a:schemeClr val="accent1">
-              <a:shade val="50000"/>
-            </a:schemeClr>
-          </a:lnRef>
-          <a:fillRef idx="1">
-            <a:schemeClr val="accent1"/>
-          </a:fillRef>
-          <a:effectRef idx="0">
-            <a:schemeClr val="accent1"/>
-          </a:effectRef>
-          <a:fontRef idx="minor">
-            <a:schemeClr val="lt1"/>
-          </a:fontRef>
-        </p:style>
-        <p:txBody>
-          <a:bodyPr wrap="square" rtlCol="0" anchor="ctr">
-            <a:noAutofit/>
-          </a:bodyPr>
-          <a:lstStyle/>
-          <a:p>
-            <a:pPr marL="0" marR="0" lvl="0" indent="0" algn="ctr" defTabSz="914400" rtl="0" eaLnBrk="1" fontAlgn="auto" latinLnBrk="0" hangingPunct="1">
-              <a:lnSpc>
-                <a:spcPct val="100000"/>
-              </a:lnSpc>
-              <a:spcBef>
-                <a:spcPts val="0"/>
-              </a:spcBef>
-              <a:spcAft>
-                <a:spcPts val="0"/>
-              </a:spcAft>
-              <a:buClrTx/>
-              <a:buSzTx/>
-              <a:buFontTx/>
-              <a:buNone/>
-              <a:tabLst/>
-              <a:defRPr/>
-            </a:pPr>
-            <a:endParaRPr kumimoji="0" lang="en-US" sz="1800" b="0" i="0" u="none" strike="noStrike" kern="1200" cap="none" spc="0" normalizeH="0" baseline="0" noProof="0">
-              <a:ln>
-                <a:noFill/>
-              </a:ln>
-              <a:solidFill>
-                <a:prstClr val="white"/>
-              </a:solidFill>
-              <a:effectLst/>
-              <a:uLnTx/>
-              <a:uFillTx/>
-              <a:latin typeface="Calibri" panose="020F0502020204030204"/>
-              <a:ea typeface="+mn-ea"/>
-              <a:cs typeface="+mn-cs"/>
-            </a:endParaRPr>
-          </a:p>
-        </p:txBody>
-      </p:sp>
-      <p:pic>
-        <p:nvPicPr>
-          <p:cNvPr id="2" name="Picture 3">
-            <a:extLst>
-              <a:ext uri="{FF2B5EF4-FFF2-40B4-BE49-F238E27FC236}">
-                <a16:creationId xmlns:a16="http://schemas.microsoft.com/office/drawing/2014/main" id="{71F2EB77-F97E-4CE9-9078-EB8E5168FE45}"/>
-              </a:ext>
-            </a:extLst>
-          </p:cNvPr>
-          <p:cNvPicPr>
-            <a:picLocks noChangeAspect="1"/>
-          </p:cNvPicPr>
-          <p:nvPr/>
-        </p:nvPicPr>
-        <p:blipFill>
           <a:blip r:embed="rId3"/>
-          <a:srcRect t="2333" b="2333"/>
+          <a:srcRect t="1909" b="1909"/>
           <a:stretch/>
         </p:blipFill>
         <p:spPr>
@@ -16793,7 +15646,7 @@
                   </a:prstClr>
                 </a:solidFill>
               </a:rPr>
-              <a:t>Logistical Regression</a:t>
+              <a:t>Logistical Regression (Revised)</a:t>
             </a:r>
           </a:p>
         </p:txBody>
@@ -16844,7 +15697,7 @@
                   <a:spcPts val="600"/>
                 </a:spcAft>
               </a:pPr>
-              <a:t>8</a:t>
+              <a:t>7</a:t>
             </a:fld>
             <a:endParaRPr lang="en-GB">
               <a:solidFill>
@@ -16869,7 +15722,7 @@
 </p:sld>
 </file>
 
-<file path=ppt/slides/slide9.xml><?xml version="1.0" encoding="utf-8"?>
+<file path=ppt/slides/slide8.xml><?xml version="1.0" encoding="utf-8"?>
 <p:sld xmlns:a="http://schemas.openxmlformats.org/drawingml/2006/main" xmlns:r="http://schemas.openxmlformats.org/officeDocument/2006/relationships" xmlns:p="http://schemas.openxmlformats.org/presentationml/2006/main">
   <p:cSld>
     <p:bg>
@@ -17660,11 +16513,11 @@
             </a:pPr>
             <a:r>
               <a:rPr lang="en-US" sz="1700" b="1" dirty="0"/>
-              <a:t>Get more data samples</a:t>
+              <a:t>Improving dataset structure</a:t>
             </a:r>
             <a:r>
               <a:rPr lang="en-US" sz="1700" dirty="0"/>
-              <a:t>: As seen in the learning curve that increasing the size of the dataset reduces chances of overfitting and creates a more reliable logistical regression model.</a:t>
+              <a:t>: Improving the balance in the class samples in the dataset should make the model’s performance more consistent.  Hence, improving the model’s performance at predicting positive examples, leading to an overall improvement in the performance.</a:t>
             </a:r>
             <a:endParaRPr lang="en-US" sz="1700" i="1" dirty="0"/>
           </a:p>
@@ -17713,8 +16566,8 @@
         </p:nvSpPr>
         <p:spPr>
           <a:xfrm>
-            <a:off x="6151294" y="6356350"/>
-            <a:ext cx="3754706" cy="365125"/>
+            <a:off x="5392271" y="6356350"/>
+            <a:ext cx="4513729" cy="365125"/>
           </a:xfrm>
         </p:spPr>
         <p:txBody>
@@ -17734,7 +16587,7 @@
                   </a:prstClr>
                 </a:solidFill>
               </a:rPr>
-              <a:t>Logistical Regression</a:t>
+              <a:t>Logistical Regression (Revised)</a:t>
             </a:r>
           </a:p>
         </p:txBody>
@@ -17785,7 +16638,7 @@
                   <a:spcPts val="600"/>
                 </a:spcAft>
               </a:pPr>
-              <a:t>9</a:t>
+              <a:t>8</a:t>
             </a:fld>
             <a:endParaRPr lang="en-US">
               <a:solidFill>
@@ -17801,6 +16654,189 @@
     <p:extLst>
       <p:ext uri="{BB962C8B-B14F-4D97-AF65-F5344CB8AC3E}">
         <p14:creationId xmlns:p14="http://schemas.microsoft.com/office/powerpoint/2010/main" val="1002193766"/>
+      </p:ext>
+    </p:extLst>
+  </p:cSld>
+  <p:clrMapOvr>
+    <a:masterClrMapping/>
+  </p:clrMapOvr>
+</p:sld>
+</file>
+
+<file path=ppt/slides/slide9.xml><?xml version="1.0" encoding="utf-8"?>
+<p:sld xmlns:a="http://schemas.openxmlformats.org/drawingml/2006/main" xmlns:r="http://schemas.openxmlformats.org/officeDocument/2006/relationships" xmlns:p="http://schemas.openxmlformats.org/presentationml/2006/main">
+  <p:cSld>
+    <p:spTree>
+      <p:nvGrpSpPr>
+        <p:cNvPr id="1" name=""/>
+        <p:cNvGrpSpPr/>
+        <p:nvPr/>
+      </p:nvGrpSpPr>
+      <p:grpSpPr>
+        <a:xfrm>
+          <a:off x="0" y="0"/>
+          <a:ext cx="0" cy="0"/>
+          <a:chOff x="0" y="0"/>
+          <a:chExt cx="0" cy="0"/>
+        </a:xfrm>
+      </p:grpSpPr>
+      <p:sp>
+        <p:nvSpPr>
+          <p:cNvPr id="2" name="Title 1">
+            <a:extLst>
+              <a:ext uri="{FF2B5EF4-FFF2-40B4-BE49-F238E27FC236}">
+                <a16:creationId xmlns:a16="http://schemas.microsoft.com/office/drawing/2014/main" id="{659706C9-F26D-46CA-93BF-8C27012F6B12}"/>
+              </a:ext>
+            </a:extLst>
+          </p:cNvPr>
+          <p:cNvSpPr>
+            <a:spLocks noGrp="1"/>
+          </p:cNvSpPr>
+          <p:nvPr>
+            <p:ph type="title"/>
+          </p:nvPr>
+        </p:nvSpPr>
+        <p:spPr/>
+        <p:txBody>
+          <a:bodyPr rtlCol="0"/>
+          <a:lstStyle/>
+          <a:p>
+            <a:pPr rtl="0"/>
+            <a:r>
+              <a:rPr lang="en-GB"/>
+              <a:t>Thank you</a:t>
+            </a:r>
+          </a:p>
+        </p:txBody>
+      </p:sp>
+      <p:sp>
+        <p:nvSpPr>
+          <p:cNvPr id="5" name="Footer Placeholder 4">
+            <a:extLst>
+              <a:ext uri="{FF2B5EF4-FFF2-40B4-BE49-F238E27FC236}">
+                <a16:creationId xmlns:a16="http://schemas.microsoft.com/office/drawing/2014/main" id="{C75D06EF-9416-46F7-8230-B49EE1269F53}"/>
+              </a:ext>
+            </a:extLst>
+          </p:cNvPr>
+          <p:cNvSpPr>
+            <a:spLocks noGrp="1"/>
+          </p:cNvSpPr>
+          <p:nvPr>
+            <p:ph type="ftr" sz="quarter" idx="11"/>
+          </p:nvPr>
+        </p:nvSpPr>
+        <p:spPr/>
+        <p:txBody>
+          <a:bodyPr rtlCol="0"/>
+          <a:lstStyle/>
+          <a:p>
+            <a:pPr>
+              <a:defRPr/>
+            </a:pPr>
+            <a:r>
+              <a:rPr lang="en-GB" dirty="0">
+                <a:solidFill>
+                  <a:prstClr val="black">
+                    <a:tint val="75000"/>
+                  </a:prstClr>
+                </a:solidFill>
+              </a:rPr>
+              <a:t>Logistical Regression (Revised)</a:t>
+            </a:r>
+          </a:p>
+        </p:txBody>
+      </p:sp>
+      <p:sp>
+        <p:nvSpPr>
+          <p:cNvPr id="6" name="Slide Number Placeholder 5">
+            <a:extLst>
+              <a:ext uri="{FF2B5EF4-FFF2-40B4-BE49-F238E27FC236}">
+                <a16:creationId xmlns:a16="http://schemas.microsoft.com/office/drawing/2014/main" id="{7359025F-68D1-4F50-8480-3F981455D4DE}"/>
+              </a:ext>
+            </a:extLst>
+          </p:cNvPr>
+          <p:cNvSpPr>
+            <a:spLocks noGrp="1"/>
+          </p:cNvSpPr>
+          <p:nvPr>
+            <p:ph type="sldNum" sz="quarter" idx="12"/>
+          </p:nvPr>
+        </p:nvSpPr>
+        <p:spPr/>
+        <p:txBody>
+          <a:bodyPr rtlCol="0"/>
+          <a:lstStyle/>
+          <a:p>
+            <a:pPr lvl="0" rtl="0"/>
+            <a:fld id="{D76B855D-E9CC-4FF8-AD85-6CDC7B89A0DE}" type="slidenum">
+              <a:rPr lang="en-GB" smtClean="0"/>
+              <a:pPr lvl="0" rtl="0"/>
+              <a:t>9</a:t>
+            </a:fld>
+            <a:endParaRPr lang="en-GB"/>
+          </a:p>
+        </p:txBody>
+      </p:sp>
+      <p:sp>
+        <p:nvSpPr>
+          <p:cNvPr id="3" name="Content Placeholder 2">
+            <a:extLst>
+              <a:ext uri="{FF2B5EF4-FFF2-40B4-BE49-F238E27FC236}">
+                <a16:creationId xmlns:a16="http://schemas.microsoft.com/office/drawing/2014/main" id="{21F0B6E0-1F7C-4E6A-87B1-554ADE739CD1}"/>
+              </a:ext>
+            </a:extLst>
+          </p:cNvPr>
+          <p:cNvSpPr>
+            <a:spLocks noGrp="1"/>
+          </p:cNvSpPr>
+          <p:nvPr>
+            <p:ph idx="1"/>
+          </p:nvPr>
+        </p:nvSpPr>
+        <p:spPr/>
+        <p:txBody>
+          <a:bodyPr vert="horz" lIns="91440" tIns="45720" rIns="91440" bIns="45720" rtlCol="0" anchor="t">
+            <a:normAutofit/>
+          </a:bodyPr>
+          <a:lstStyle/>
+          <a:p>
+            <a:r>
+              <a:rPr lang="en-GB" dirty="0"/>
+              <a:t>Raj Dholakia</a:t>
+            </a:r>
+          </a:p>
+          <a:p>
+            <a:pPr rtl="0">
+              <a:spcBef>
+                <a:spcPts val="3000"/>
+              </a:spcBef>
+            </a:pPr>
+            <a:r>
+              <a:rPr lang="en-GB" sz="1800" dirty="0"/>
+              <a:t>raj.dholakia@dcmail.ca</a:t>
+            </a:r>
+          </a:p>
+          <a:p>
+            <a:pPr>
+              <a:spcBef>
+                <a:spcPts val="3000"/>
+              </a:spcBef>
+            </a:pPr>
+            <a:r>
+              <a:rPr lang="en-GB" sz="1800" dirty="0">
+                <a:ea typeface="+mn-lt"/>
+                <a:cs typeface="+mn-lt"/>
+              </a:rPr>
+              <a:t>Student ID: 100813041</a:t>
+            </a:r>
+            <a:endParaRPr lang="en-GB" sz="1800" dirty="0"/>
+          </a:p>
+        </p:txBody>
+      </p:sp>
+    </p:spTree>
+    <p:extLst>
+      <p:ext uri="{BB962C8B-B14F-4D97-AF65-F5344CB8AC3E}">
+        <p14:creationId xmlns:p14="http://schemas.microsoft.com/office/powerpoint/2010/main" val="962258905"/>
       </p:ext>
     </p:extLst>
   </p:cSld>
@@ -18602,6 +17638,15 @@
 </file>
 
 <file path=customXml/item1.xml><?xml version="1.0" encoding="utf-8"?>
+<?mso-contentType ?>
+<FormTemplates xmlns="http://schemas.microsoft.com/sharepoint/v3/contenttype/forms">
+  <Display>DocumentLibraryForm</Display>
+  <Edit>DocumentLibraryForm</Edit>
+  <New>DocumentLibraryForm</New>
+</FormTemplates>
+</file>
+
+<file path=customXml/item2.xml><?xml version="1.0" encoding="utf-8"?>
 <ct:contentTypeSchema xmlns:ct="http://schemas.microsoft.com/office/2006/metadata/contentType" xmlns:ma="http://schemas.microsoft.com/office/2006/metadata/properties/metaAttributes" ct:_="" ma:_="" ma:contentTypeName="Document" ma:contentTypeID="0x01010079F111ED35F8CC479449609E8A0923A6" ma:contentTypeVersion="12" ma:contentTypeDescription="Create a new document." ma:contentTypeScope="" ma:versionID="426e97fa315356fffbdcd9876fe988c2">
   <xsd:schema xmlns:xsd="http://www.w3.org/2001/XMLSchema" xmlns:xs="http://www.w3.org/2001/XMLSchema" xmlns:p="http://schemas.microsoft.com/office/2006/metadata/properties" xmlns:ns2="71af3243-3dd4-4a8d-8c0d-dd76da1f02a5" xmlns:ns3="16c05727-aa75-4e4a-9b5f-8a80a1165891" targetNamespace="http://schemas.microsoft.com/office/2006/metadata/properties" ma:root="true" ma:fieldsID="14b8f0def80e6d70ce3def20c90759ae" ns2:_="" ns3:_="">
     <xsd:import namespace="71af3243-3dd4-4a8d-8c0d-dd76da1f02a5"/>
@@ -18822,15 +17867,6 @@
 </ct:contentTypeSchema>
 </file>
 
-<file path=customXml/item2.xml><?xml version="1.0" encoding="utf-8"?>
-<?mso-contentType ?>
-<FormTemplates xmlns="http://schemas.microsoft.com/sharepoint/v3/contenttype/forms">
-  <Display>DocumentLibraryForm</Display>
-  <Edit>DocumentLibraryForm</Edit>
-  <New>DocumentLibraryForm</New>
-</FormTemplates>
-</file>
-
 <file path=customXml/item3.xml><?xml version="1.0" encoding="utf-8"?>
 <p:properties xmlns:p="http://schemas.microsoft.com/office/2006/metadata/properties" xmlns:xsi="http://www.w3.org/2001/XMLSchema-instance" xmlns:pc="http://schemas.microsoft.com/office/infopath/2007/PartnerControls">
   <documentManagement>
@@ -18841,6 +17877,14 @@
 </file>
 
 <file path=customXml/itemProps1.xml><?xml version="1.0" encoding="utf-8"?>
+<ds:datastoreItem xmlns:ds="http://schemas.openxmlformats.org/officeDocument/2006/customXml" ds:itemID="{C3D3D887-4EBB-4786-8316-C89D0BB9706F}">
+  <ds:schemaRefs>
+    <ds:schemaRef ds:uri="http://schemas.microsoft.com/sharepoint/v3/contenttype/forms"/>
+  </ds:schemaRefs>
+</ds:datastoreItem>
+</file>
+
+<file path=customXml/itemProps2.xml><?xml version="1.0" encoding="utf-8"?>
 <ds:datastoreItem xmlns:ds="http://schemas.openxmlformats.org/officeDocument/2006/customXml" ds:itemID="{2BBC4E2F-F3E1-4F05-9206-4E311F2B3D99}">
   <ds:schemaRefs>
     <ds:schemaRef ds:uri="16c05727-aa75-4e4a-9b5f-8a80a1165891"/>
@@ -18859,14 +17903,6 @@
 </ds:datastoreItem>
 </file>
 
-<file path=customXml/itemProps2.xml><?xml version="1.0" encoding="utf-8"?>
-<ds:datastoreItem xmlns:ds="http://schemas.openxmlformats.org/officeDocument/2006/customXml" ds:itemID="{C3D3D887-4EBB-4786-8316-C89D0BB9706F}">
-  <ds:schemaRefs>
-    <ds:schemaRef ds:uri="http://schemas.microsoft.com/sharepoint/v3/contenttype/forms"/>
-  </ds:schemaRefs>
-</ds:datastoreItem>
-</file>
-
 <file path=customXml/itemProps3.xml><?xml version="1.0" encoding="utf-8"?>
 <ds:datastoreItem xmlns:ds="http://schemas.openxmlformats.org/officeDocument/2006/customXml" ds:itemID="{E613E4D1-157A-4FD3-BF11-7582A03ADF37}">
   <ds:schemaRefs>

</xml_diff>